<commit_message>
updated presentation WITH formula
</commit_message>
<xml_diff>
--- a/Presentation/Final_presentation_group_002.pptx
+++ b/Presentation/Final_presentation_group_002.pptx
@@ -314,7 +314,7 @@
           <a:p>
             <a:fld id="{23147F37-A102-294C-8CE0-32EFA4497810}" type="datetimeFigureOut">
               <a:rPr lang="nl-NL" smtClean="0"/>
-              <a:t>03-04-15</a:t>
+              <a:t>04-04-15</a:t>
             </a:fld>
             <a:endParaRPr lang="nl-NL"/>
           </a:p>
@@ -484,7 +484,7 @@
           <a:p>
             <a:fld id="{23147F37-A102-294C-8CE0-32EFA4497810}" type="datetimeFigureOut">
               <a:rPr lang="nl-NL" smtClean="0"/>
-              <a:t>03-04-15</a:t>
+              <a:t>04-04-15</a:t>
             </a:fld>
             <a:endParaRPr lang="nl-NL"/>
           </a:p>
@@ -664,7 +664,7 @@
           <a:p>
             <a:fld id="{23147F37-A102-294C-8CE0-32EFA4497810}" type="datetimeFigureOut">
               <a:rPr lang="nl-NL" smtClean="0"/>
-              <a:t>03-04-15</a:t>
+              <a:t>04-04-15</a:t>
             </a:fld>
             <a:endParaRPr lang="nl-NL"/>
           </a:p>
@@ -834,7 +834,7 @@
           <a:p>
             <a:fld id="{23147F37-A102-294C-8CE0-32EFA4497810}" type="datetimeFigureOut">
               <a:rPr lang="nl-NL" smtClean="0"/>
-              <a:t>03-04-15</a:t>
+              <a:t>04-04-15</a:t>
             </a:fld>
             <a:endParaRPr lang="nl-NL"/>
           </a:p>
@@ -1080,7 +1080,7 @@
           <a:p>
             <a:fld id="{23147F37-A102-294C-8CE0-32EFA4497810}" type="datetimeFigureOut">
               <a:rPr lang="nl-NL" smtClean="0"/>
-              <a:t>03-04-15</a:t>
+              <a:t>04-04-15</a:t>
             </a:fld>
             <a:endParaRPr lang="nl-NL"/>
           </a:p>
@@ -1368,7 +1368,7 @@
           <a:p>
             <a:fld id="{23147F37-A102-294C-8CE0-32EFA4497810}" type="datetimeFigureOut">
               <a:rPr lang="nl-NL" smtClean="0"/>
-              <a:t>03-04-15</a:t>
+              <a:t>04-04-15</a:t>
             </a:fld>
             <a:endParaRPr lang="nl-NL"/>
           </a:p>
@@ -1790,7 +1790,7 @@
           <a:p>
             <a:fld id="{23147F37-A102-294C-8CE0-32EFA4497810}" type="datetimeFigureOut">
               <a:rPr lang="nl-NL" smtClean="0"/>
-              <a:t>03-04-15</a:t>
+              <a:t>04-04-15</a:t>
             </a:fld>
             <a:endParaRPr lang="nl-NL"/>
           </a:p>
@@ -1908,7 +1908,7 @@
           <a:p>
             <a:fld id="{23147F37-A102-294C-8CE0-32EFA4497810}" type="datetimeFigureOut">
               <a:rPr lang="nl-NL" smtClean="0"/>
-              <a:t>03-04-15</a:t>
+              <a:t>04-04-15</a:t>
             </a:fld>
             <a:endParaRPr lang="nl-NL"/>
           </a:p>
@@ -2003,7 +2003,7 @@
           <a:p>
             <a:fld id="{23147F37-A102-294C-8CE0-32EFA4497810}" type="datetimeFigureOut">
               <a:rPr lang="nl-NL" smtClean="0"/>
-              <a:t>03-04-15</a:t>
+              <a:t>04-04-15</a:t>
             </a:fld>
             <a:endParaRPr lang="nl-NL"/>
           </a:p>
@@ -2280,7 +2280,7 @@
           <a:p>
             <a:fld id="{23147F37-A102-294C-8CE0-32EFA4497810}" type="datetimeFigureOut">
               <a:rPr lang="nl-NL" smtClean="0"/>
-              <a:t>03-04-15</a:t>
+              <a:t>04-04-15</a:t>
             </a:fld>
             <a:endParaRPr lang="nl-NL"/>
           </a:p>
@@ -2533,7 +2533,7 @@
           <a:p>
             <a:fld id="{23147F37-A102-294C-8CE0-32EFA4497810}" type="datetimeFigureOut">
               <a:rPr lang="nl-NL" smtClean="0"/>
-              <a:t>03-04-15</a:t>
+              <a:t>04-04-15</a:t>
             </a:fld>
             <a:endParaRPr lang="nl-NL"/>
           </a:p>
@@ -2762,7 +2762,7 @@
           <a:p>
             <a:fld id="{23147F37-A102-294C-8CE0-32EFA4497810}" type="datetimeFigureOut">
               <a:rPr lang="nl-NL" smtClean="0"/>
-              <a:t>03-04-15</a:t>
+              <a:t>04-04-15</a:t>
             </a:fld>
             <a:endParaRPr lang="nl-NL"/>
           </a:p>
@@ -3492,15 +3492,7 @@
             </a:r>
             <a:r>
               <a:rPr lang="en-US" sz="2000" dirty="0" smtClean="0"/>
-              <a:t>of </a:t>
-            </a:r>
-            <a:r>
-              <a:rPr lang="en-US" sz="2000" dirty="0" smtClean="0"/>
-              <a:t>our </a:t>
-            </a:r>
-            <a:r>
-              <a:rPr lang="en-US" sz="2000" dirty="0" smtClean="0"/>
-              <a:t>news website by</a:t>
+              <a:t>of our news website by</a:t>
             </a:r>
           </a:p>
           <a:p>
@@ -6581,7 +6573,6 @@
               <a:rPr lang="en-US" sz="2000" dirty="0" smtClean="0"/>
               <a:t>explanation</a:t>
             </a:r>
-            <a:endParaRPr lang="en-US" sz="2000" dirty="0" smtClean="0"/>
           </a:p>
         </p:txBody>
       </p:sp>
@@ -7022,17 +7013,12 @@
           <a:p>
             <a:r>
               <a:rPr lang="en-US" sz="2000" b="1" dirty="0" smtClean="0"/>
-              <a:t>2. 	Scrape</a:t>
-            </a:r>
-            <a:r>
-              <a:rPr lang="en-US" sz="2000" b="1" dirty="0" smtClean="0"/>
-              <a:t> </a:t>
+              <a:t>2. 	Scrape </a:t>
             </a:r>
             <a:r>
               <a:rPr lang="en-US" sz="2000" dirty="0" smtClean="0"/>
               <a:t>news articles</a:t>
             </a:r>
-            <a:endParaRPr lang="en-US" sz="2000" dirty="0" smtClean="0"/>
           </a:p>
         </p:txBody>
       </p:sp>
@@ -7525,11 +7511,7 @@
             </a:r>
             <a:r>
               <a:rPr lang="en-US" sz="2000" b="1" dirty="0" smtClean="0"/>
-              <a:t>. 	Provide</a:t>
-            </a:r>
-            <a:r>
-              <a:rPr lang="en-US" sz="2000" b="1" dirty="0" smtClean="0"/>
-              <a:t> </a:t>
+              <a:t>. 	Provide </a:t>
             </a:r>
             <a:r>
               <a:rPr lang="en-US" sz="2000" dirty="0" smtClean="0"/>
@@ -7543,11 +7525,6 @@
               </a:rPr>
               <a:t>manually</a:t>
             </a:r>
-            <a:endParaRPr lang="en-US" sz="2000" b="1" dirty="0" smtClean="0">
-              <a:solidFill>
-                <a:srgbClr val="0000FF"/>
-              </a:solidFill>
-            </a:endParaRPr>
           </a:p>
         </p:txBody>
       </p:sp>
@@ -8447,11 +8424,7 @@
           <a:p>
             <a:r>
               <a:rPr lang="en-US" sz="2000" b="1" dirty="0" smtClean="0"/>
-              <a:t>4.</a:t>
-            </a:r>
-            <a:r>
-              <a:rPr lang="en-US" sz="2000" b="1" dirty="0" smtClean="0"/>
-              <a:t> 	Semantically </a:t>
+              <a:t>4. 	Semantically </a:t>
             </a:r>
             <a:r>
               <a:rPr lang="en-US" sz="2000" dirty="0" smtClean="0"/>
@@ -8465,11 +8438,6 @@
               </a:rPr>
               <a:t>automatically</a:t>
             </a:r>
-            <a:endParaRPr lang="en-US" sz="2000" b="1" dirty="0" smtClean="0">
-              <a:solidFill>
-                <a:srgbClr val="008000"/>
-              </a:solidFill>
-            </a:endParaRPr>
           </a:p>
         </p:txBody>
       </p:sp>
@@ -9212,17 +9180,12 @@
           <a:p>
             <a:r>
               <a:rPr lang="en-US" sz="2000" b="1" dirty="0" smtClean="0"/>
-              <a:t>5. 	Review</a:t>
-            </a:r>
-            <a:r>
-              <a:rPr lang="en-US" sz="2000" b="1" dirty="0" smtClean="0"/>
-              <a:t> </a:t>
+              <a:t>5. 	Review </a:t>
             </a:r>
             <a:r>
               <a:rPr lang="en-US" sz="2000" dirty="0" smtClean="0"/>
               <a:t>explanation</a:t>
             </a:r>
-            <a:endParaRPr lang="en-US" sz="2000" dirty="0" smtClean="0"/>
           </a:p>
         </p:txBody>
       </p:sp>
@@ -16444,7 +16407,6 @@
               <a:rPr lang="en-GB" sz="1800" dirty="0"/>
               <a:t> (MMR) method</a:t>
             </a:r>
-            <a:endParaRPr lang="en-GB" sz="1800" dirty="0"/>
           </a:p>
         </p:txBody>
       </p:sp>
@@ -16818,31 +16780,241 @@
           </a:p>
         </p:txBody>
       </p:sp>
+      <p:sp>
+        <p:nvSpPr>
+          <p:cNvPr id="6" name="Tekstvak 5"/>
+          <p:cNvSpPr txBox="1"/>
+          <p:nvPr/>
+        </p:nvSpPr>
+        <p:spPr>
+          <a:xfrm>
+            <a:off x="396007" y="1051401"/>
+            <a:ext cx="184666" cy="369332"/>
+          </a:xfrm>
+          <a:prstGeom prst="rect">
+            <a:avLst/>
+          </a:prstGeom>
+          <a:noFill/>
+        </p:spPr>
+        <p:txBody>
+          <a:bodyPr wrap="none" rtlCol="0">
+            <a:spAutoFit/>
+          </a:bodyPr>
+          <a:lstStyle/>
+          <a:p>
+            <a:endParaRPr lang="en-US" dirty="0"/>
+          </a:p>
+        </p:txBody>
+      </p:sp>
+      <p:sp>
+        <p:nvSpPr>
+          <p:cNvPr id="2" name="Tekstvak 1"/>
+          <p:cNvSpPr txBox="1"/>
+          <p:nvPr/>
+        </p:nvSpPr>
+        <p:spPr>
+          <a:xfrm>
+            <a:off x="706835" y="986599"/>
+            <a:ext cx="5060325" cy="369332"/>
+          </a:xfrm>
+          <a:prstGeom prst="rect">
+            <a:avLst/>
+          </a:prstGeom>
+          <a:noFill/>
+        </p:spPr>
+        <p:txBody>
+          <a:bodyPr wrap="none" rtlCol="0">
+            <a:spAutoFit/>
+          </a:bodyPr>
+          <a:lstStyle/>
+          <a:p>
+            <a:r>
+              <a:rPr lang="en-US" b="1" dirty="0" smtClean="0"/>
+              <a:t>Combining </a:t>
+            </a:r>
+            <a:r>
+              <a:rPr lang="en-US" dirty="0" smtClean="0"/>
+              <a:t>all to </a:t>
+            </a:r>
+            <a:r>
+              <a:rPr lang="en-US" b="1" dirty="0" smtClean="0"/>
+              <a:t>rank </a:t>
+            </a:r>
+            <a:r>
+              <a:rPr lang="en-US" dirty="0" smtClean="0"/>
+              <a:t>the articles on total </a:t>
+            </a:r>
+            <a:r>
+              <a:rPr lang="en-US" b="1" dirty="0" smtClean="0"/>
+              <a:t>relevance</a:t>
+            </a:r>
+            <a:endParaRPr lang="en-US" b="1" dirty="0"/>
+          </a:p>
+        </p:txBody>
+      </p:sp>
       <mc:AlternateContent xmlns:mc="http://schemas.openxmlformats.org/markup-compatibility/2006">
         <mc:Choice xmlns:a14="http://schemas.microsoft.com/office/drawing/2010/main" Requires="a14">
           <p:sp>
             <p:nvSpPr>
-              <p:cNvPr id="3" name="Content Placeholder 6"/>
-              <p:cNvSpPr>
-                <a:spLocks noGrp="1"/>
+              <p:cNvPr id="8" name="Content Placeholder 6"/>
+              <p:cNvSpPr txBox="1">
+                <a:spLocks/>
               </p:cNvSpPr>
-              <p:nvPr>
-                <p:ph idx="1"/>
-              </p:nvPr>
+              <p:nvPr/>
             </p:nvSpPr>
             <p:spPr>
               <a:xfrm>
-                <a:off x="539462" y="2123185"/>
+                <a:off x="454856" y="2033655"/>
                 <a:ext cx="8065077" cy="3927764"/>
               </a:xfrm>
+              <a:prstGeom prst="rect">
+                <a:avLst/>
+              </a:prstGeom>
             </p:spPr>
             <p:txBody>
-              <a:bodyPr>
+              <a:bodyPr vert="horz" lIns="91440" tIns="45720" rIns="91440" bIns="45720" rtlCol="0">
                 <a:normAutofit fontScale="92500"/>
               </a:bodyPr>
-              <a:lstStyle/>
+              <a:lstStyle>
+                <a:lvl1pPr marL="342900" indent="-342900" algn="l" defTabSz="457200" rtl="0" eaLnBrk="1" latinLnBrk="0" hangingPunct="1">
+                  <a:spcBef>
+                    <a:spcPct val="20000"/>
+                  </a:spcBef>
+                  <a:buFont typeface="Arial"/>
+                  <a:buChar char="•"/>
+                  <a:defRPr sz="3200" kern="1200">
+                    <a:solidFill>
+                      <a:schemeClr val="tx1"/>
+                    </a:solidFill>
+                    <a:latin typeface="+mn-lt"/>
+                    <a:ea typeface="+mn-ea"/>
+                    <a:cs typeface="+mn-cs"/>
+                  </a:defRPr>
+                </a:lvl1pPr>
+                <a:lvl2pPr marL="742950" indent="-285750" algn="l" defTabSz="457200" rtl="0" eaLnBrk="1" latinLnBrk="0" hangingPunct="1">
+                  <a:spcBef>
+                    <a:spcPct val="20000"/>
+                  </a:spcBef>
+                  <a:buFont typeface="Arial"/>
+                  <a:buChar char="–"/>
+                  <a:defRPr sz="2800" kern="1200">
+                    <a:solidFill>
+                      <a:schemeClr val="tx1"/>
+                    </a:solidFill>
+                    <a:latin typeface="+mn-lt"/>
+                    <a:ea typeface="+mn-ea"/>
+                    <a:cs typeface="+mn-cs"/>
+                  </a:defRPr>
+                </a:lvl2pPr>
+                <a:lvl3pPr marL="1143000" indent="-228600" algn="l" defTabSz="457200" rtl="0" eaLnBrk="1" latinLnBrk="0" hangingPunct="1">
+                  <a:spcBef>
+                    <a:spcPct val="20000"/>
+                  </a:spcBef>
+                  <a:buFont typeface="Arial"/>
+                  <a:buChar char="•"/>
+                  <a:defRPr sz="2400" kern="1200">
+                    <a:solidFill>
+                      <a:schemeClr val="tx1"/>
+                    </a:solidFill>
+                    <a:latin typeface="+mn-lt"/>
+                    <a:ea typeface="+mn-ea"/>
+                    <a:cs typeface="+mn-cs"/>
+                  </a:defRPr>
+                </a:lvl3pPr>
+                <a:lvl4pPr marL="1600200" indent="-228600" algn="l" defTabSz="457200" rtl="0" eaLnBrk="1" latinLnBrk="0" hangingPunct="1">
+                  <a:spcBef>
+                    <a:spcPct val="20000"/>
+                  </a:spcBef>
+                  <a:buFont typeface="Arial"/>
+                  <a:buChar char="–"/>
+                  <a:defRPr sz="2000" kern="1200">
+                    <a:solidFill>
+                      <a:schemeClr val="tx1"/>
+                    </a:solidFill>
+                    <a:latin typeface="+mn-lt"/>
+                    <a:ea typeface="+mn-ea"/>
+                    <a:cs typeface="+mn-cs"/>
+                  </a:defRPr>
+                </a:lvl4pPr>
+                <a:lvl5pPr marL="2057400" indent="-228600" algn="l" defTabSz="457200" rtl="0" eaLnBrk="1" latinLnBrk="0" hangingPunct="1">
+                  <a:spcBef>
+                    <a:spcPct val="20000"/>
+                  </a:spcBef>
+                  <a:buFont typeface="Arial"/>
+                  <a:buChar char="»"/>
+                  <a:defRPr sz="2000" kern="1200">
+                    <a:solidFill>
+                      <a:schemeClr val="tx1"/>
+                    </a:solidFill>
+                    <a:latin typeface="+mn-lt"/>
+                    <a:ea typeface="+mn-ea"/>
+                    <a:cs typeface="+mn-cs"/>
+                  </a:defRPr>
+                </a:lvl5pPr>
+                <a:lvl6pPr marL="2514600" indent="-228600" algn="l" defTabSz="457200" rtl="0" eaLnBrk="1" latinLnBrk="0" hangingPunct="1">
+                  <a:spcBef>
+                    <a:spcPct val="20000"/>
+                  </a:spcBef>
+                  <a:buFont typeface="Arial"/>
+                  <a:buChar char="•"/>
+                  <a:defRPr sz="2000" kern="1200">
+                    <a:solidFill>
+                      <a:schemeClr val="tx1"/>
+                    </a:solidFill>
+                    <a:latin typeface="+mn-lt"/>
+                    <a:ea typeface="+mn-ea"/>
+                    <a:cs typeface="+mn-cs"/>
+                  </a:defRPr>
+                </a:lvl6pPr>
+                <a:lvl7pPr marL="2971800" indent="-228600" algn="l" defTabSz="457200" rtl="0" eaLnBrk="1" latinLnBrk="0" hangingPunct="1">
+                  <a:spcBef>
+                    <a:spcPct val="20000"/>
+                  </a:spcBef>
+                  <a:buFont typeface="Arial"/>
+                  <a:buChar char="•"/>
+                  <a:defRPr sz="2000" kern="1200">
+                    <a:solidFill>
+                      <a:schemeClr val="tx1"/>
+                    </a:solidFill>
+                    <a:latin typeface="+mn-lt"/>
+                    <a:ea typeface="+mn-ea"/>
+                    <a:cs typeface="+mn-cs"/>
+                  </a:defRPr>
+                </a:lvl7pPr>
+                <a:lvl8pPr marL="3429000" indent="-228600" algn="l" defTabSz="457200" rtl="0" eaLnBrk="1" latinLnBrk="0" hangingPunct="1">
+                  <a:spcBef>
+                    <a:spcPct val="20000"/>
+                  </a:spcBef>
+                  <a:buFont typeface="Arial"/>
+                  <a:buChar char="•"/>
+                  <a:defRPr sz="2000" kern="1200">
+                    <a:solidFill>
+                      <a:schemeClr val="tx1"/>
+                    </a:solidFill>
+                    <a:latin typeface="+mn-lt"/>
+                    <a:ea typeface="+mn-ea"/>
+                    <a:cs typeface="+mn-cs"/>
+                  </a:defRPr>
+                </a:lvl8pPr>
+                <a:lvl9pPr marL="3886200" indent="-228600" algn="l" defTabSz="457200" rtl="0" eaLnBrk="1" latinLnBrk="0" hangingPunct="1">
+                  <a:spcBef>
+                    <a:spcPct val="20000"/>
+                  </a:spcBef>
+                  <a:buFont typeface="Arial"/>
+                  <a:buChar char="•"/>
+                  <a:defRPr sz="2000" kern="1200">
+                    <a:solidFill>
+                      <a:schemeClr val="tx1"/>
+                    </a:solidFill>
+                    <a:latin typeface="+mn-lt"/>
+                    <a:ea typeface="+mn-ea"/>
+                    <a:cs typeface="+mn-cs"/>
+                  </a:defRPr>
+                </a:lvl9pPr>
+              </a:lstStyle>
               <a:p>
                 <a:pPr marL="0" indent="0">
+                  <a:buFont typeface="Arial"/>
                   <a:buNone/>
                 </a:pPr>
                 <a14:m/>
@@ -16850,6 +17022,7 @@
               </a:p>
               <a:p>
                 <a:pPr marL="0" indent="0">
+                  <a:buFont typeface="Arial"/>
                   <a:buNone/>
                 </a:pPr>
                 <a:endParaRPr lang="nl-NL" sz="2400" i="1" dirty="0" smtClean="0">
@@ -17091,19 +17264,20 @@
         <mc:Fallback>
           <p:sp>
             <p:nvSpPr>
-              <p:cNvPr id="3" name="Content Placeholder 6"/>
-              <p:cNvSpPr>
-                <a:spLocks noGrp="1" noRot="1" noChangeAspect="1" noMove="1" noResize="1" noEditPoints="1" noAdjustHandles="1" noChangeArrowheads="1" noChangeShapeType="1" noTextEdit="1"/>
+              <p:cNvPr id="8" name="Content Placeholder 6"/>
+              <p:cNvSpPr txBox="1">
+                <a:spLocks noRot="1" noChangeAspect="1" noMove="1" noResize="1" noEditPoints="1" noAdjustHandles="1" noChangeArrowheads="1" noChangeShapeType="1" noTextEdit="1"/>
               </p:cNvSpPr>
-              <p:nvPr>
-                <p:ph idx="1"/>
-              </p:nvPr>
+              <p:nvPr/>
             </p:nvSpPr>
             <p:spPr>
               <a:xfrm>
-                <a:off x="539462" y="2123185"/>
+                <a:off x="454856" y="2033655"/>
                 <a:ext cx="8065077" cy="3927764"/>
               </a:xfrm>
+              <a:prstGeom prst="rect">
+                <a:avLst/>
+              </a:prstGeom>
               <a:blipFill rotWithShape="1">
                 <a:blip r:embed="rId2"/>
                 <a:stretch>
@@ -17126,78 +17300,6 @@
           </p:sp>
         </mc:Fallback>
       </mc:AlternateContent>
-      <p:sp>
-        <p:nvSpPr>
-          <p:cNvPr id="6" name="Tekstvak 5"/>
-          <p:cNvSpPr txBox="1"/>
-          <p:nvPr/>
-        </p:nvSpPr>
-        <p:spPr>
-          <a:xfrm>
-            <a:off x="396007" y="1051401"/>
-            <a:ext cx="184666" cy="369332"/>
-          </a:xfrm>
-          <a:prstGeom prst="rect">
-            <a:avLst/>
-          </a:prstGeom>
-          <a:noFill/>
-        </p:spPr>
-        <p:txBody>
-          <a:bodyPr wrap="none" rtlCol="0">
-            <a:spAutoFit/>
-          </a:bodyPr>
-          <a:lstStyle/>
-          <a:p>
-            <a:endParaRPr lang="en-US" dirty="0"/>
-          </a:p>
-        </p:txBody>
-      </p:sp>
-      <p:sp>
-        <p:nvSpPr>
-          <p:cNvPr id="2" name="Tekstvak 1"/>
-          <p:cNvSpPr txBox="1"/>
-          <p:nvPr/>
-        </p:nvSpPr>
-        <p:spPr>
-          <a:xfrm>
-            <a:off x="706835" y="986599"/>
-            <a:ext cx="5060325" cy="369332"/>
-          </a:xfrm>
-          <a:prstGeom prst="rect">
-            <a:avLst/>
-          </a:prstGeom>
-          <a:noFill/>
-        </p:spPr>
-        <p:txBody>
-          <a:bodyPr wrap="none" rtlCol="0">
-            <a:spAutoFit/>
-          </a:bodyPr>
-          <a:lstStyle/>
-          <a:p>
-            <a:r>
-              <a:rPr lang="en-US" b="1" dirty="0" smtClean="0"/>
-              <a:t>Combining </a:t>
-            </a:r>
-            <a:r>
-              <a:rPr lang="en-US" dirty="0" smtClean="0"/>
-              <a:t>all to </a:t>
-            </a:r>
-            <a:r>
-              <a:rPr lang="en-US" b="1" dirty="0" smtClean="0"/>
-              <a:t>rank </a:t>
-            </a:r>
-            <a:r>
-              <a:rPr lang="en-US" dirty="0" smtClean="0"/>
-              <a:t>the articles on total </a:t>
-            </a:r>
-            <a:r>
-              <a:rPr lang="en-US" b="1" dirty="0" smtClean="0"/>
-              <a:t>relevance</a:t>
-            </a:r>
-            <a:endParaRPr lang="en-US" b="1" dirty="0"/>
-          </a:p>
-        </p:txBody>
-      </p:sp>
     </p:spTree>
     <p:extLst>
       <p:ext uri="{BB962C8B-B14F-4D97-AF65-F5344CB8AC3E}">
@@ -17957,11 +18059,7 @@
             </a:r>
             <a:r>
               <a:rPr lang="en-US" dirty="0" smtClean="0"/>
-              <a:t>dollars</a:t>
-            </a:r>
-            <a:r>
-              <a:rPr lang="en-US" dirty="0" smtClean="0"/>
-              <a:t>?</a:t>
+              <a:t>dollars?</a:t>
             </a:r>
           </a:p>
           <a:p>

</xml_diff>

<commit_message>
some revision and added play framework
</commit_message>
<xml_diff>
--- a/Presentation/Final_presentation_group_002.pptx
+++ b/Presentation/Final_presentation_group_002.pptx
@@ -314,7 +314,7 @@
           <a:p>
             <a:fld id="{23147F37-A102-294C-8CE0-32EFA4497810}" type="datetimeFigureOut">
               <a:rPr lang="nl-NL" smtClean="0"/>
-              <a:t>04-04-15</a:t>
+              <a:t>05-04-15</a:t>
             </a:fld>
             <a:endParaRPr lang="nl-NL"/>
           </a:p>
@@ -484,7 +484,7 @@
           <a:p>
             <a:fld id="{23147F37-A102-294C-8CE0-32EFA4497810}" type="datetimeFigureOut">
               <a:rPr lang="nl-NL" smtClean="0"/>
-              <a:t>04-04-15</a:t>
+              <a:t>05-04-15</a:t>
             </a:fld>
             <a:endParaRPr lang="nl-NL"/>
           </a:p>
@@ -664,7 +664,7 @@
           <a:p>
             <a:fld id="{23147F37-A102-294C-8CE0-32EFA4497810}" type="datetimeFigureOut">
               <a:rPr lang="nl-NL" smtClean="0"/>
-              <a:t>04-04-15</a:t>
+              <a:t>05-04-15</a:t>
             </a:fld>
             <a:endParaRPr lang="nl-NL"/>
           </a:p>
@@ -834,7 +834,7 @@
           <a:p>
             <a:fld id="{23147F37-A102-294C-8CE0-32EFA4497810}" type="datetimeFigureOut">
               <a:rPr lang="nl-NL" smtClean="0"/>
-              <a:t>04-04-15</a:t>
+              <a:t>05-04-15</a:t>
             </a:fld>
             <a:endParaRPr lang="nl-NL"/>
           </a:p>
@@ -1080,7 +1080,7 @@
           <a:p>
             <a:fld id="{23147F37-A102-294C-8CE0-32EFA4497810}" type="datetimeFigureOut">
               <a:rPr lang="nl-NL" smtClean="0"/>
-              <a:t>04-04-15</a:t>
+              <a:t>05-04-15</a:t>
             </a:fld>
             <a:endParaRPr lang="nl-NL"/>
           </a:p>
@@ -1368,7 +1368,7 @@
           <a:p>
             <a:fld id="{23147F37-A102-294C-8CE0-32EFA4497810}" type="datetimeFigureOut">
               <a:rPr lang="nl-NL" smtClean="0"/>
-              <a:t>04-04-15</a:t>
+              <a:t>05-04-15</a:t>
             </a:fld>
             <a:endParaRPr lang="nl-NL"/>
           </a:p>
@@ -1790,7 +1790,7 @@
           <a:p>
             <a:fld id="{23147F37-A102-294C-8CE0-32EFA4497810}" type="datetimeFigureOut">
               <a:rPr lang="nl-NL" smtClean="0"/>
-              <a:t>04-04-15</a:t>
+              <a:t>05-04-15</a:t>
             </a:fld>
             <a:endParaRPr lang="nl-NL"/>
           </a:p>
@@ -1908,7 +1908,7 @@
           <a:p>
             <a:fld id="{23147F37-A102-294C-8CE0-32EFA4497810}" type="datetimeFigureOut">
               <a:rPr lang="nl-NL" smtClean="0"/>
-              <a:t>04-04-15</a:t>
+              <a:t>05-04-15</a:t>
             </a:fld>
             <a:endParaRPr lang="nl-NL"/>
           </a:p>
@@ -2003,7 +2003,7 @@
           <a:p>
             <a:fld id="{23147F37-A102-294C-8CE0-32EFA4497810}" type="datetimeFigureOut">
               <a:rPr lang="nl-NL" smtClean="0"/>
-              <a:t>04-04-15</a:t>
+              <a:t>05-04-15</a:t>
             </a:fld>
             <a:endParaRPr lang="nl-NL"/>
           </a:p>
@@ -2280,7 +2280,7 @@
           <a:p>
             <a:fld id="{23147F37-A102-294C-8CE0-32EFA4497810}" type="datetimeFigureOut">
               <a:rPr lang="nl-NL" smtClean="0"/>
-              <a:t>04-04-15</a:t>
+              <a:t>05-04-15</a:t>
             </a:fld>
             <a:endParaRPr lang="nl-NL"/>
           </a:p>
@@ -2533,7 +2533,7 @@
           <a:p>
             <a:fld id="{23147F37-A102-294C-8CE0-32EFA4497810}" type="datetimeFigureOut">
               <a:rPr lang="nl-NL" smtClean="0"/>
-              <a:t>04-04-15</a:t>
+              <a:t>05-04-15</a:t>
             </a:fld>
             <a:endParaRPr lang="nl-NL"/>
           </a:p>
@@ -2762,7 +2762,7 @@
           <a:p>
             <a:fld id="{23147F37-A102-294C-8CE0-32EFA4497810}" type="datetimeFigureOut">
               <a:rPr lang="nl-NL" smtClean="0"/>
-              <a:t>04-04-15</a:t>
+              <a:t>05-04-15</a:t>
             </a:fld>
             <a:endParaRPr lang="nl-NL"/>
           </a:p>
@@ -4712,8 +4712,8 @@
         </p:blipFill>
         <p:spPr>
           <a:xfrm>
-            <a:off x="3989976" y="996599"/>
-            <a:ext cx="1379013" cy="922512"/>
+            <a:off x="3947901" y="996599"/>
+            <a:ext cx="1020416" cy="682623"/>
           </a:xfrm>
           <a:prstGeom prst="rect">
             <a:avLst/>
@@ -4736,8 +4736,8 @@
         </p:blipFill>
         <p:spPr>
           <a:xfrm>
-            <a:off x="3989976" y="3805916"/>
-            <a:ext cx="1171222" cy="1171222"/>
+            <a:off x="4837703" y="2814008"/>
+            <a:ext cx="846617" cy="846617"/>
           </a:xfrm>
           <a:prstGeom prst="rect">
             <a:avLst/>
@@ -4760,8 +4760,8 @@
         </p:blipFill>
         <p:spPr>
           <a:xfrm>
-            <a:off x="4131087" y="2286000"/>
-            <a:ext cx="1030111" cy="1030111"/>
+            <a:off x="4086441" y="1893944"/>
+            <a:ext cx="751262" cy="751262"/>
           </a:xfrm>
           <a:prstGeom prst="rect">
             <a:avLst/>
@@ -4790,7 +4790,7 @@
         </p:blipFill>
         <p:spPr>
           <a:xfrm>
-            <a:off x="3012913" y="5561120"/>
+            <a:off x="3012913" y="5575063"/>
             <a:ext cx="596434" cy="584852"/>
           </a:xfrm>
           <a:prstGeom prst="rect">
@@ -4852,7 +4852,7 @@
         </p:nvSpPr>
         <p:spPr>
           <a:xfrm>
-            <a:off x="3609347" y="5642484"/>
+            <a:off x="3609347" y="5656427"/>
             <a:ext cx="338554" cy="461665"/>
           </a:xfrm>
           <a:prstGeom prst="rect">
@@ -4890,7 +4890,7 @@
         </p:blipFill>
         <p:spPr>
           <a:xfrm>
-            <a:off x="3911927" y="5561120"/>
+            <a:off x="3911927" y="5575063"/>
             <a:ext cx="905838" cy="640032"/>
           </a:xfrm>
           <a:prstGeom prst="rect">
@@ -4907,7 +4907,7 @@
         <p:spPr>
           <a:xfrm>
             <a:off x="2899948" y="297845"/>
-            <a:ext cx="3316111" cy="6326912"/>
+            <a:ext cx="3316111" cy="6411744"/>
           </a:xfrm>
           <a:prstGeom prst="roundRect">
             <a:avLst/>
@@ -4984,7 +4984,7 @@
         </p:nvSpPr>
         <p:spPr>
           <a:xfrm>
-            <a:off x="454778" y="2286000"/>
+            <a:off x="454778" y="1893944"/>
             <a:ext cx="8220611" cy="400110"/>
           </a:xfrm>
           <a:prstGeom prst="rect">
@@ -5013,48 +5013,6 @@
             <a:r>
               <a:rPr lang="en-US" sz="2000" dirty="0" smtClean="0"/>
               <a:t>	Bloomberg</a:t>
-            </a:r>
-            <a:endParaRPr lang="en-US" sz="2000" dirty="0"/>
-          </a:p>
-        </p:txBody>
-      </p:sp>
-      <p:sp>
-        <p:nvSpPr>
-          <p:cNvPr id="19" name="Tekstvak 18"/>
-          <p:cNvSpPr txBox="1"/>
-          <p:nvPr/>
-        </p:nvSpPr>
-        <p:spPr>
-          <a:xfrm>
-            <a:off x="454778" y="3810944"/>
-            <a:ext cx="8220611" cy="400110"/>
-          </a:xfrm>
-          <a:prstGeom prst="rect">
-            <a:avLst/>
-          </a:prstGeom>
-          <a:noFill/>
-        </p:spPr>
-        <p:txBody>
-          <a:bodyPr wrap="square" rtlCol="0">
-            <a:spAutoFit/>
-          </a:bodyPr>
-          <a:lstStyle/>
-          <a:p>
-            <a:r>
-              <a:rPr lang="en-US" sz="2000" b="1" dirty="0" smtClean="0"/>
-              <a:t>Database	</a:t>
-            </a:r>
-            <a:r>
-              <a:rPr lang="en-US" sz="2000" dirty="0" smtClean="0"/>
-              <a:t>											</a:t>
-            </a:r>
-            <a:r>
-              <a:rPr lang="en-US" sz="2000" dirty="0" err="1" smtClean="0"/>
-              <a:t>PostGreSQL</a:t>
-            </a:r>
-            <a:r>
-              <a:rPr lang="en-US" sz="2000" dirty="0" smtClean="0"/>
-              <a:t>	</a:t>
             </a:r>
             <a:endParaRPr lang="en-US" sz="2000" dirty="0"/>
           </a:p>
@@ -5068,7 +5026,7 @@
         </p:nvSpPr>
         <p:spPr>
           <a:xfrm>
-            <a:off x="454778" y="5202385"/>
+            <a:off x="454778" y="5314188"/>
             <a:ext cx="8220611" cy="1015663"/>
           </a:xfrm>
           <a:prstGeom prst="rect">
@@ -5083,8 +5041,8 @@
           <a:lstStyle/>
           <a:p>
             <a:r>
-              <a:rPr lang="en-US" sz="2000" b="1" dirty="0" smtClean="0"/>
-              <a:t>IR Model</a:t>
+              <a:rPr lang="en-US" sz="2000" dirty="0" smtClean="0"/>
+              <a:t>		</a:t>
             </a:r>
             <a:r>
               <a:rPr lang="en-US" sz="2000" dirty="0" smtClean="0"/>
@@ -5101,8 +5059,12 @@
           </a:p>
           <a:p>
             <a:r>
-              <a:rPr lang="en-US" sz="2000" dirty="0"/>
-              <a:t>	</a:t>
+              <a:rPr lang="en-US" sz="2000" b="1" dirty="0"/>
+              <a:t>IR </a:t>
+            </a:r>
+            <a:r>
+              <a:rPr lang="en-US" sz="2000" b="1" dirty="0" smtClean="0"/>
+              <a:t>Model</a:t>
             </a:r>
             <a:r>
               <a:rPr lang="en-US" sz="2000" dirty="0" smtClean="0"/>
@@ -5146,7 +5108,7 @@
         </p:nvSpPr>
         <p:spPr>
           <a:xfrm>
-            <a:off x="4822644" y="5642484"/>
+            <a:off x="4822644" y="5656427"/>
             <a:ext cx="338554" cy="461665"/>
           </a:xfrm>
           <a:prstGeom prst="rect">
@@ -5190,8 +5152,218 @@
         </p:blipFill>
         <p:spPr>
           <a:xfrm>
-            <a:off x="4822644" y="5202385"/>
+            <a:off x="4822644" y="5216328"/>
             <a:ext cx="1615177" cy="1211383"/>
+          </a:xfrm>
+          <a:prstGeom prst="rect">
+            <a:avLst/>
+          </a:prstGeom>
+        </p:spPr>
+      </p:pic>
+      <p:sp>
+        <p:nvSpPr>
+          <p:cNvPr id="9" name="Tekstvak 8"/>
+          <p:cNvSpPr txBox="1"/>
+          <p:nvPr/>
+        </p:nvSpPr>
+        <p:spPr>
+          <a:xfrm>
+            <a:off x="454778" y="2837207"/>
+            <a:ext cx="8220611" cy="707886"/>
+          </a:xfrm>
+          <a:prstGeom prst="rect">
+            <a:avLst/>
+          </a:prstGeom>
+          <a:noFill/>
+        </p:spPr>
+        <p:txBody>
+          <a:bodyPr wrap="square" rtlCol="0">
+            <a:spAutoFit/>
+          </a:bodyPr>
+          <a:lstStyle/>
+          <a:p>
+            <a:r>
+              <a:rPr lang="en-US" sz="2000" b="1" dirty="0" smtClean="0"/>
+              <a:t>Back-end &amp;											</a:t>
+            </a:r>
+            <a:r>
+              <a:rPr lang="en-US" sz="2000" dirty="0" smtClean="0"/>
+              <a:t>Play Framework &amp;</a:t>
+            </a:r>
+            <a:endParaRPr lang="en-US" sz="2000" b="1" dirty="0"/>
+          </a:p>
+          <a:p>
+            <a:r>
+              <a:rPr lang="en-US" sz="2000" b="1" dirty="0" smtClean="0"/>
+              <a:t>Database										</a:t>
+            </a:r>
+            <a:r>
+              <a:rPr lang="en-US" sz="2000" b="1" dirty="0"/>
+              <a:t>	</a:t>
+            </a:r>
+            <a:r>
+              <a:rPr lang="en-US" sz="2000" dirty="0" err="1"/>
+              <a:t>PostGreSQL</a:t>
+            </a:r>
+            <a:r>
+              <a:rPr lang="en-US" sz="2000" dirty="0"/>
+              <a:t>	</a:t>
+            </a:r>
+            <a:endParaRPr lang="en-US" sz="2000" b="1" dirty="0"/>
+          </a:p>
+        </p:txBody>
+      </p:sp>
+      <p:pic>
+        <p:nvPicPr>
+          <p:cNvPr id="10" name="Afbeelding 9"/>
+          <p:cNvPicPr>
+            <a:picLocks noChangeAspect="1"/>
+          </p:cNvPicPr>
+          <p:nvPr/>
+        </p:nvPicPr>
+        <p:blipFill>
+          <a:blip r:embed="rId8"/>
+          <a:stretch>
+            <a:fillRect/>
+          </a:stretch>
+        </p:blipFill>
+        <p:spPr>
+          <a:xfrm>
+            <a:off x="3272074" y="2976921"/>
+            <a:ext cx="997143" cy="520792"/>
+          </a:xfrm>
+          <a:prstGeom prst="rect">
+            <a:avLst/>
+          </a:prstGeom>
+        </p:spPr>
+      </p:pic>
+      <p:pic>
+        <p:nvPicPr>
+          <p:cNvPr id="22" name="Afbeelding 21" descr="brains.png"/>
+          <p:cNvPicPr>
+            <a:picLocks noChangeAspect="1"/>
+          </p:cNvPicPr>
+          <p:nvPr/>
+        </p:nvPicPr>
+        <p:blipFill rotWithShape="1">
+          <a:blip r:embed="rId9">
+            <a:extLst>
+              <a:ext uri="{28A0092B-C50C-407E-A947-70E740481C1C}">
+                <a14:useLocalDpi xmlns:a14="http://schemas.microsoft.com/office/drawing/2010/main" val="0"/>
+              </a:ext>
+            </a:extLst>
+          </a:blip>
+          <a:srcRect l="9084" r="34790"/>
+          <a:stretch/>
+        </p:blipFill>
+        <p:spPr>
+          <a:xfrm flipH="1">
+            <a:off x="3779841" y="3896990"/>
+            <a:ext cx="899014" cy="924286"/>
+          </a:xfrm>
+          <a:prstGeom prst="rect">
+            <a:avLst/>
+          </a:prstGeom>
+        </p:spPr>
+      </p:pic>
+      <p:sp>
+        <p:nvSpPr>
+          <p:cNvPr id="23" name="Tekstvak 22"/>
+          <p:cNvSpPr txBox="1"/>
+          <p:nvPr/>
+        </p:nvSpPr>
+        <p:spPr>
+          <a:xfrm>
+            <a:off x="4349664" y="2976921"/>
+            <a:ext cx="432762" cy="461665"/>
+          </a:xfrm>
+          <a:prstGeom prst="rect">
+            <a:avLst/>
+          </a:prstGeom>
+          <a:noFill/>
+        </p:spPr>
+        <p:txBody>
+          <a:bodyPr wrap="square" rtlCol="0">
+            <a:spAutoFit/>
+          </a:bodyPr>
+          <a:lstStyle/>
+          <a:p>
+            <a:r>
+              <a:rPr lang="en-US" sz="2400" dirty="0" smtClean="0"/>
+              <a:t>+</a:t>
+            </a:r>
+            <a:endParaRPr lang="en-US" sz="2400" dirty="0"/>
+          </a:p>
+        </p:txBody>
+      </p:sp>
+      <p:sp>
+        <p:nvSpPr>
+          <p:cNvPr id="24" name="Tekstvak 23"/>
+          <p:cNvSpPr txBox="1"/>
+          <p:nvPr/>
+        </p:nvSpPr>
+        <p:spPr>
+          <a:xfrm>
+            <a:off x="454778" y="4151223"/>
+            <a:ext cx="8220611" cy="400110"/>
+          </a:xfrm>
+          <a:prstGeom prst="rect">
+            <a:avLst/>
+          </a:prstGeom>
+          <a:noFill/>
+        </p:spPr>
+        <p:txBody>
+          <a:bodyPr wrap="square" rtlCol="0">
+            <a:spAutoFit/>
+          </a:bodyPr>
+          <a:lstStyle/>
+          <a:p>
+            <a:r>
+              <a:rPr lang="en-US" sz="2000" b="1" dirty="0" smtClean="0"/>
+              <a:t>Human Computation</a:t>
+            </a:r>
+            <a:r>
+              <a:rPr lang="en-US" sz="2000" dirty="0" smtClean="0"/>
+              <a:t>								</a:t>
+            </a:r>
+            <a:r>
+              <a:rPr lang="en-US" sz="2000" dirty="0"/>
+              <a:t>	</a:t>
+            </a:r>
+            <a:r>
+              <a:rPr lang="en-US" sz="2000" dirty="0" smtClean="0"/>
+              <a:t>	</a:t>
+            </a:r>
+            <a:r>
+              <a:rPr lang="en-US" sz="2000" dirty="0" smtClean="0"/>
+              <a:t>Readers</a:t>
+            </a:r>
+          </a:p>
+        </p:txBody>
+      </p:sp>
+      <p:pic>
+        <p:nvPicPr>
+          <p:cNvPr id="25" name="Afbeelding 24" descr="brains.png"/>
+          <p:cNvPicPr>
+            <a:picLocks noChangeAspect="1"/>
+          </p:cNvPicPr>
+          <p:nvPr/>
+        </p:nvPicPr>
+        <p:blipFill rotWithShape="1">
+          <a:blip r:embed="rId9">
+            <a:extLst>
+              <a:ext uri="{28A0092B-C50C-407E-A947-70E740481C1C}">
+                <a14:useLocalDpi xmlns:a14="http://schemas.microsoft.com/office/drawing/2010/main" val="0"/>
+              </a:ext>
+            </a:extLst>
+          </a:blip>
+          <a:srcRect l="9084" r="34790"/>
+          <a:stretch/>
+        </p:blipFill>
+        <p:spPr>
+          <a:xfrm>
+            <a:off x="4474036" y="3896990"/>
+            <a:ext cx="926367" cy="924286"/>
           </a:xfrm>
           <a:prstGeom prst="rect">
             <a:avLst/>
@@ -5642,6 +5814,64 @@
                                   </p:childTnLst>
                                 </p:cTn>
                               </p:par>
+                              <p:par>
+                                <p:cTn id="33" presetID="12" presetClass="entr" presetSubtype="4" fill="hold" nodeType="withEffect">
+                                  <p:stCondLst>
+                                    <p:cond delay="0"/>
+                                  </p:stCondLst>
+                                  <p:childTnLst>
+                                    <p:set>
+                                      <p:cBhvr>
+                                        <p:cTn id="34" dur="1" fill="hold">
+                                          <p:stCondLst>
+                                            <p:cond delay="0"/>
+                                          </p:stCondLst>
+                                        </p:cTn>
+                                        <p:tgtEl>
+                                          <p:spTgt spid="3"/>
+                                        </p:tgtEl>
+                                        <p:attrNameLst>
+                                          <p:attrName>style.visibility</p:attrName>
+                                        </p:attrNameLst>
+                                      </p:cBhvr>
+                                      <p:to>
+                                        <p:strVal val="visible"/>
+                                      </p:to>
+                                    </p:set>
+                                    <p:anim calcmode="lin" valueType="num">
+                                      <p:cBhvr additive="base">
+                                        <p:cTn id="35" dur="500"/>
+                                        <p:tgtEl>
+                                          <p:spTgt spid="3"/>
+                                        </p:tgtEl>
+                                        <p:attrNameLst>
+                                          <p:attrName>ppt_y</p:attrName>
+                                        </p:attrNameLst>
+                                      </p:cBhvr>
+                                      <p:tavLst>
+                                        <p:tav tm="0">
+                                          <p:val>
+                                            <p:strVal val="#ppt_y+#ppt_h*1.125000"/>
+                                          </p:val>
+                                        </p:tav>
+                                        <p:tav tm="100000">
+                                          <p:val>
+                                            <p:strVal val="#ppt_y"/>
+                                          </p:val>
+                                        </p:tav>
+                                      </p:tavLst>
+                                    </p:anim>
+                                    <p:animEffect transition="in" filter="wipe(up)">
+                                      <p:cBhvr>
+                                        <p:cTn id="36" dur="500"/>
+                                        <p:tgtEl>
+                                          <p:spTgt spid="3"/>
+                                        </p:tgtEl>
+                                      </p:cBhvr>
+                                    </p:animEffect>
+                                  </p:childTnLst>
+                                </p:cTn>
+                              </p:par>
                             </p:childTnLst>
                           </p:cTn>
                         </p:par>
@@ -5649,77 +5879,19 @@
                     </p:cTn>
                   </p:par>
                   <p:par>
-                    <p:cTn id="33" fill="hold">
+                    <p:cTn id="37" fill="hold">
                       <p:stCondLst>
                         <p:cond delay="indefinite"/>
                       </p:stCondLst>
                       <p:childTnLst>
                         <p:par>
-                          <p:cTn id="34" fill="hold">
+                          <p:cTn id="38" fill="hold">
                             <p:stCondLst>
                               <p:cond delay="0"/>
                             </p:stCondLst>
                             <p:childTnLst>
                               <p:par>
-                                <p:cTn id="35" presetID="12" presetClass="entr" presetSubtype="4" fill="hold" grpId="0" nodeType="clickEffect">
-                                  <p:stCondLst>
-                                    <p:cond delay="0"/>
-                                  </p:stCondLst>
-                                  <p:childTnLst>
-                                    <p:set>
-                                      <p:cBhvr>
-                                        <p:cTn id="36" dur="1" fill="hold">
-                                          <p:stCondLst>
-                                            <p:cond delay="0"/>
-                                          </p:stCondLst>
-                                        </p:cTn>
-                                        <p:tgtEl>
-                                          <p:spTgt spid="19"/>
-                                        </p:tgtEl>
-                                        <p:attrNameLst>
-                                          <p:attrName>style.visibility</p:attrName>
-                                        </p:attrNameLst>
-                                      </p:cBhvr>
-                                      <p:to>
-                                        <p:strVal val="visible"/>
-                                      </p:to>
-                                    </p:set>
-                                    <p:anim calcmode="lin" valueType="num">
-                                      <p:cBhvr additive="base">
-                                        <p:cTn id="37" dur="500"/>
-                                        <p:tgtEl>
-                                          <p:spTgt spid="19"/>
-                                        </p:tgtEl>
-                                        <p:attrNameLst>
-                                          <p:attrName>ppt_y</p:attrName>
-                                        </p:attrNameLst>
-                                      </p:cBhvr>
-                                      <p:tavLst>
-                                        <p:tav tm="0">
-                                          <p:val>
-                                            <p:strVal val="#ppt_y+#ppt_h*1.125000"/>
-                                          </p:val>
-                                        </p:tav>
-                                        <p:tav tm="100000">
-                                          <p:val>
-                                            <p:strVal val="#ppt_y"/>
-                                          </p:val>
-                                        </p:tav>
-                                      </p:tavLst>
-                                    </p:anim>
-                                    <p:animEffect transition="in" filter="wipe(up)">
-                                      <p:cBhvr>
-                                        <p:cTn id="38" dur="500"/>
-                                        <p:tgtEl>
-                                          <p:spTgt spid="19"/>
-                                        </p:tgtEl>
-                                      </p:cBhvr>
-                                    </p:animEffect>
-                                  </p:childTnLst>
-                                </p:cTn>
-                              </p:par>
-                              <p:par>
-                                <p:cTn id="39" presetID="12" presetClass="entr" presetSubtype="4" fill="hold" nodeType="withEffect">
+                                <p:cTn id="39" presetID="12" presetClass="entr" presetSubtype="4" fill="hold" grpId="0" nodeType="clickEffect">
                                   <p:stCondLst>
                                     <p:cond delay="0"/>
                                   </p:stCondLst>
@@ -5732,7 +5904,7 @@
                                           </p:stCondLst>
                                         </p:cTn>
                                         <p:tgtEl>
-                                          <p:spTgt spid="3"/>
+                                          <p:spTgt spid="20"/>
                                         </p:tgtEl>
                                         <p:attrNameLst>
                                           <p:attrName>style.visibility</p:attrName>
@@ -5746,7 +5918,7 @@
                                       <p:cBhvr additive="base">
                                         <p:cTn id="41" dur="500"/>
                                         <p:tgtEl>
-                                          <p:spTgt spid="3"/>
+                                          <p:spTgt spid="20"/>
                                         </p:tgtEl>
                                         <p:attrNameLst>
                                           <p:attrName>ppt_y</p:attrName>
@@ -5769,7 +5941,355 @@
                                       <p:cBhvr>
                                         <p:cTn id="42" dur="500"/>
                                         <p:tgtEl>
-                                          <p:spTgt spid="3"/>
+                                          <p:spTgt spid="20"/>
+                                        </p:tgtEl>
+                                      </p:cBhvr>
+                                    </p:animEffect>
+                                  </p:childTnLst>
+                                </p:cTn>
+                              </p:par>
+                              <p:par>
+                                <p:cTn id="43" presetID="12" presetClass="entr" presetSubtype="4" fill="hold" nodeType="withEffect">
+                                  <p:stCondLst>
+                                    <p:cond delay="0"/>
+                                  </p:stCondLst>
+                                  <p:childTnLst>
+                                    <p:set>
+                                      <p:cBhvr>
+                                        <p:cTn id="44" dur="1" fill="hold">
+                                          <p:stCondLst>
+                                            <p:cond delay="0"/>
+                                          </p:stCondLst>
+                                        </p:cTn>
+                                        <p:tgtEl>
+                                          <p:spTgt spid="11"/>
+                                        </p:tgtEl>
+                                        <p:attrNameLst>
+                                          <p:attrName>style.visibility</p:attrName>
+                                        </p:attrNameLst>
+                                      </p:cBhvr>
+                                      <p:to>
+                                        <p:strVal val="visible"/>
+                                      </p:to>
+                                    </p:set>
+                                    <p:anim calcmode="lin" valueType="num">
+                                      <p:cBhvr additive="base">
+                                        <p:cTn id="45" dur="500"/>
+                                        <p:tgtEl>
+                                          <p:spTgt spid="11"/>
+                                        </p:tgtEl>
+                                        <p:attrNameLst>
+                                          <p:attrName>ppt_y</p:attrName>
+                                        </p:attrNameLst>
+                                      </p:cBhvr>
+                                      <p:tavLst>
+                                        <p:tav tm="0">
+                                          <p:val>
+                                            <p:strVal val="#ppt_y+#ppt_h*1.125000"/>
+                                          </p:val>
+                                        </p:tav>
+                                        <p:tav tm="100000">
+                                          <p:val>
+                                            <p:strVal val="#ppt_y"/>
+                                          </p:val>
+                                        </p:tav>
+                                      </p:tavLst>
+                                    </p:anim>
+                                    <p:animEffect transition="in" filter="wipe(up)">
+                                      <p:cBhvr>
+                                        <p:cTn id="46" dur="500"/>
+                                        <p:tgtEl>
+                                          <p:spTgt spid="11"/>
+                                        </p:tgtEl>
+                                      </p:cBhvr>
+                                    </p:animEffect>
+                                  </p:childTnLst>
+                                </p:cTn>
+                              </p:par>
+                              <p:par>
+                                <p:cTn id="47" presetID="12" presetClass="entr" presetSubtype="4" fill="hold" grpId="0" nodeType="withEffect">
+                                  <p:stCondLst>
+                                    <p:cond delay="0"/>
+                                  </p:stCondLst>
+                                  <p:childTnLst>
+                                    <p:set>
+                                      <p:cBhvr>
+                                        <p:cTn id="48" dur="1" fill="hold">
+                                          <p:stCondLst>
+                                            <p:cond delay="0"/>
+                                          </p:stCondLst>
+                                        </p:cTn>
+                                        <p:tgtEl>
+                                          <p:spTgt spid="13"/>
+                                        </p:tgtEl>
+                                        <p:attrNameLst>
+                                          <p:attrName>style.visibility</p:attrName>
+                                        </p:attrNameLst>
+                                      </p:cBhvr>
+                                      <p:to>
+                                        <p:strVal val="visible"/>
+                                      </p:to>
+                                    </p:set>
+                                    <p:anim calcmode="lin" valueType="num">
+                                      <p:cBhvr additive="base">
+                                        <p:cTn id="49" dur="500"/>
+                                        <p:tgtEl>
+                                          <p:spTgt spid="13"/>
+                                        </p:tgtEl>
+                                        <p:attrNameLst>
+                                          <p:attrName>ppt_y</p:attrName>
+                                        </p:attrNameLst>
+                                      </p:cBhvr>
+                                      <p:tavLst>
+                                        <p:tav tm="0">
+                                          <p:val>
+                                            <p:strVal val="#ppt_y+#ppt_h*1.125000"/>
+                                          </p:val>
+                                        </p:tav>
+                                        <p:tav tm="100000">
+                                          <p:val>
+                                            <p:strVal val="#ppt_y"/>
+                                          </p:val>
+                                        </p:tav>
+                                      </p:tavLst>
+                                    </p:anim>
+                                    <p:animEffect transition="in" filter="wipe(up)">
+                                      <p:cBhvr>
+                                        <p:cTn id="50" dur="500"/>
+                                        <p:tgtEl>
+                                          <p:spTgt spid="13"/>
+                                        </p:tgtEl>
+                                      </p:cBhvr>
+                                    </p:animEffect>
+                                  </p:childTnLst>
+                                </p:cTn>
+                              </p:par>
+                              <p:par>
+                                <p:cTn id="51" presetID="12" presetClass="entr" presetSubtype="4" fill="hold" nodeType="withEffect">
+                                  <p:stCondLst>
+                                    <p:cond delay="0"/>
+                                  </p:stCondLst>
+                                  <p:childTnLst>
+                                    <p:set>
+                                      <p:cBhvr>
+                                        <p:cTn id="52" dur="1" fill="hold">
+                                          <p:stCondLst>
+                                            <p:cond delay="0"/>
+                                          </p:stCondLst>
+                                        </p:cTn>
+                                        <p:tgtEl>
+                                          <p:spTgt spid="14"/>
+                                        </p:tgtEl>
+                                        <p:attrNameLst>
+                                          <p:attrName>style.visibility</p:attrName>
+                                        </p:attrNameLst>
+                                      </p:cBhvr>
+                                      <p:to>
+                                        <p:strVal val="visible"/>
+                                      </p:to>
+                                    </p:set>
+                                    <p:anim calcmode="lin" valueType="num">
+                                      <p:cBhvr additive="base">
+                                        <p:cTn id="53" dur="500"/>
+                                        <p:tgtEl>
+                                          <p:spTgt spid="14"/>
+                                        </p:tgtEl>
+                                        <p:attrNameLst>
+                                          <p:attrName>ppt_y</p:attrName>
+                                        </p:attrNameLst>
+                                      </p:cBhvr>
+                                      <p:tavLst>
+                                        <p:tav tm="0">
+                                          <p:val>
+                                            <p:strVal val="#ppt_y+#ppt_h*1.125000"/>
+                                          </p:val>
+                                        </p:tav>
+                                        <p:tav tm="100000">
+                                          <p:val>
+                                            <p:strVal val="#ppt_y"/>
+                                          </p:val>
+                                        </p:tav>
+                                      </p:tavLst>
+                                    </p:anim>
+                                    <p:animEffect transition="in" filter="wipe(up)">
+                                      <p:cBhvr>
+                                        <p:cTn id="54" dur="500"/>
+                                        <p:tgtEl>
+                                          <p:spTgt spid="14"/>
+                                        </p:tgtEl>
+                                      </p:cBhvr>
+                                    </p:animEffect>
+                                  </p:childTnLst>
+                                </p:cTn>
+                              </p:par>
+                              <p:par>
+                                <p:cTn id="55" presetID="12" presetClass="entr" presetSubtype="4" fill="hold" grpId="0" nodeType="withEffect">
+                                  <p:stCondLst>
+                                    <p:cond delay="0"/>
+                                  </p:stCondLst>
+                                  <p:childTnLst>
+                                    <p:set>
+                                      <p:cBhvr>
+                                        <p:cTn id="56" dur="1" fill="hold">
+                                          <p:stCondLst>
+                                            <p:cond delay="0"/>
+                                          </p:stCondLst>
+                                        </p:cTn>
+                                        <p:tgtEl>
+                                          <p:spTgt spid="21"/>
+                                        </p:tgtEl>
+                                        <p:attrNameLst>
+                                          <p:attrName>style.visibility</p:attrName>
+                                        </p:attrNameLst>
+                                      </p:cBhvr>
+                                      <p:to>
+                                        <p:strVal val="visible"/>
+                                      </p:to>
+                                    </p:set>
+                                    <p:anim calcmode="lin" valueType="num">
+                                      <p:cBhvr additive="base">
+                                        <p:cTn id="57" dur="500"/>
+                                        <p:tgtEl>
+                                          <p:spTgt spid="21"/>
+                                        </p:tgtEl>
+                                        <p:attrNameLst>
+                                          <p:attrName>ppt_y</p:attrName>
+                                        </p:attrNameLst>
+                                      </p:cBhvr>
+                                      <p:tavLst>
+                                        <p:tav tm="0">
+                                          <p:val>
+                                            <p:strVal val="#ppt_y+#ppt_h*1.125000"/>
+                                          </p:val>
+                                        </p:tav>
+                                        <p:tav tm="100000">
+                                          <p:val>
+                                            <p:strVal val="#ppt_y"/>
+                                          </p:val>
+                                        </p:tav>
+                                      </p:tavLst>
+                                    </p:anim>
+                                    <p:animEffect transition="in" filter="wipe(up)">
+                                      <p:cBhvr>
+                                        <p:cTn id="58" dur="500"/>
+                                        <p:tgtEl>
+                                          <p:spTgt spid="21"/>
+                                        </p:tgtEl>
+                                      </p:cBhvr>
+                                    </p:animEffect>
+                                  </p:childTnLst>
+                                </p:cTn>
+                              </p:par>
+                              <p:par>
+                                <p:cTn id="59" presetID="12" presetClass="entr" presetSubtype="4" fill="hold" nodeType="withEffect">
+                                  <p:stCondLst>
+                                    <p:cond delay="0"/>
+                                  </p:stCondLst>
+                                  <p:childTnLst>
+                                    <p:set>
+                                      <p:cBhvr>
+                                        <p:cTn id="60" dur="1" fill="hold">
+                                          <p:stCondLst>
+                                            <p:cond delay="0"/>
+                                          </p:stCondLst>
+                                        </p:cTn>
+                                        <p:tgtEl>
+                                          <p:spTgt spid="5"/>
+                                        </p:tgtEl>
+                                        <p:attrNameLst>
+                                          <p:attrName>style.visibility</p:attrName>
+                                        </p:attrNameLst>
+                                      </p:cBhvr>
+                                      <p:to>
+                                        <p:strVal val="visible"/>
+                                      </p:to>
+                                    </p:set>
+                                    <p:anim calcmode="lin" valueType="num">
+                                      <p:cBhvr additive="base">
+                                        <p:cTn id="61" dur="500"/>
+                                        <p:tgtEl>
+                                          <p:spTgt spid="5"/>
+                                        </p:tgtEl>
+                                        <p:attrNameLst>
+                                          <p:attrName>ppt_y</p:attrName>
+                                        </p:attrNameLst>
+                                      </p:cBhvr>
+                                      <p:tavLst>
+                                        <p:tav tm="0">
+                                          <p:val>
+                                            <p:strVal val="#ppt_y+#ppt_h*1.125000"/>
+                                          </p:val>
+                                        </p:tav>
+                                        <p:tav tm="100000">
+                                          <p:val>
+                                            <p:strVal val="#ppt_y"/>
+                                          </p:val>
+                                        </p:tav>
+                                      </p:tavLst>
+                                    </p:anim>
+                                    <p:animEffect transition="in" filter="wipe(up)">
+                                      <p:cBhvr>
+                                        <p:cTn id="62" dur="500"/>
+                                        <p:tgtEl>
+                                          <p:spTgt spid="5"/>
+                                        </p:tgtEl>
+                                      </p:cBhvr>
+                                    </p:animEffect>
+                                  </p:childTnLst>
+                                </p:cTn>
+                              </p:par>
+                              <p:par>
+                                <p:cTn id="63" presetID="12" presetClass="entr" presetSubtype="4" fill="hold" grpId="0" nodeType="withEffect">
+                                  <p:stCondLst>
+                                    <p:cond delay="0"/>
+                                  </p:stCondLst>
+                                  <p:childTnLst>
+                                    <p:set>
+                                      <p:cBhvr>
+                                        <p:cTn id="64" dur="1" fill="hold">
+                                          <p:stCondLst>
+                                            <p:cond delay="0"/>
+                                          </p:stCondLst>
+                                        </p:cTn>
+                                        <p:tgtEl>
+                                          <p:spTgt spid="23"/>
+                                        </p:tgtEl>
+                                        <p:attrNameLst>
+                                          <p:attrName>style.visibility</p:attrName>
+                                        </p:attrNameLst>
+                                      </p:cBhvr>
+                                      <p:to>
+                                        <p:strVal val="visible"/>
+                                      </p:to>
+                                    </p:set>
+                                    <p:anim calcmode="lin" valueType="num">
+                                      <p:cBhvr additive="base">
+                                        <p:cTn id="65" dur="500"/>
+                                        <p:tgtEl>
+                                          <p:spTgt spid="23"/>
+                                        </p:tgtEl>
+                                        <p:attrNameLst>
+                                          <p:attrName>ppt_y</p:attrName>
+                                        </p:attrNameLst>
+                                      </p:cBhvr>
+                                      <p:tavLst>
+                                        <p:tav tm="0">
+                                          <p:val>
+                                            <p:strVal val="#ppt_y+#ppt_h*1.125000"/>
+                                          </p:val>
+                                        </p:tav>
+                                        <p:tav tm="100000">
+                                          <p:val>
+                                            <p:strVal val="#ppt_y"/>
+                                          </p:val>
+                                        </p:tav>
+                                      </p:tavLst>
+                                    </p:anim>
+                                    <p:animEffect transition="in" filter="wipe(up)">
+                                      <p:cBhvr>
+                                        <p:cTn id="66" dur="500"/>
+                                        <p:tgtEl>
+                                          <p:spTgt spid="23"/>
                                         </p:tgtEl>
                                       </p:cBhvr>
                                     </p:animEffect>
@@ -5783,32 +6303,32 @@
                     </p:cTn>
                   </p:par>
                   <p:par>
-                    <p:cTn id="43" fill="hold">
+                    <p:cTn id="67" fill="hold">
                       <p:stCondLst>
                         <p:cond delay="indefinite"/>
                       </p:stCondLst>
                       <p:childTnLst>
                         <p:par>
-                          <p:cTn id="44" fill="hold">
+                          <p:cTn id="68" fill="hold">
                             <p:stCondLst>
                               <p:cond delay="0"/>
                             </p:stCondLst>
                             <p:childTnLst>
                               <p:par>
-                                <p:cTn id="45" presetID="12" presetClass="entr" presetSubtype="4" fill="hold" grpId="0" nodeType="clickEffect">
+                                <p:cTn id="69" presetID="12" presetClass="entr" presetSubtype="4" fill="hold" grpId="0" nodeType="clickEffect">
                                   <p:stCondLst>
                                     <p:cond delay="0"/>
                                   </p:stCondLst>
                                   <p:childTnLst>
                                     <p:set>
                                       <p:cBhvr>
-                                        <p:cTn id="46" dur="1" fill="hold">
+                                        <p:cTn id="70" dur="1" fill="hold">
                                           <p:stCondLst>
                                             <p:cond delay="0"/>
                                           </p:stCondLst>
                                         </p:cTn>
                                         <p:tgtEl>
-                                          <p:spTgt spid="20"/>
+                                          <p:spTgt spid="24"/>
                                         </p:tgtEl>
                                         <p:attrNameLst>
                                           <p:attrName>style.visibility</p:attrName>
@@ -5820,9 +6340,9 @@
                                     </p:set>
                                     <p:anim calcmode="lin" valueType="num">
                                       <p:cBhvr additive="base">
-                                        <p:cTn id="47" dur="500"/>
-                                        <p:tgtEl>
-                                          <p:spTgt spid="20"/>
+                                        <p:cTn id="71" dur="500"/>
+                                        <p:tgtEl>
+                                          <p:spTgt spid="24"/>
                                         </p:tgtEl>
                                         <p:attrNameLst>
                                           <p:attrName>ppt_y</p:attrName>
@@ -5843,299 +6363,9 @@
                                     </p:anim>
                                     <p:animEffect transition="in" filter="wipe(up)">
                                       <p:cBhvr>
-                                        <p:cTn id="48" dur="500"/>
-                                        <p:tgtEl>
-                                          <p:spTgt spid="20"/>
-                                        </p:tgtEl>
-                                      </p:cBhvr>
-                                    </p:animEffect>
-                                  </p:childTnLst>
-                                </p:cTn>
-                              </p:par>
-                              <p:par>
-                                <p:cTn id="49" presetID="12" presetClass="entr" presetSubtype="4" fill="hold" nodeType="withEffect">
-                                  <p:stCondLst>
-                                    <p:cond delay="0"/>
-                                  </p:stCondLst>
-                                  <p:childTnLst>
-                                    <p:set>
-                                      <p:cBhvr>
-                                        <p:cTn id="50" dur="1" fill="hold">
-                                          <p:stCondLst>
-                                            <p:cond delay="0"/>
-                                          </p:stCondLst>
-                                        </p:cTn>
-                                        <p:tgtEl>
-                                          <p:spTgt spid="11"/>
-                                        </p:tgtEl>
-                                        <p:attrNameLst>
-                                          <p:attrName>style.visibility</p:attrName>
-                                        </p:attrNameLst>
-                                      </p:cBhvr>
-                                      <p:to>
-                                        <p:strVal val="visible"/>
-                                      </p:to>
-                                    </p:set>
-                                    <p:anim calcmode="lin" valueType="num">
-                                      <p:cBhvr additive="base">
-                                        <p:cTn id="51" dur="500"/>
-                                        <p:tgtEl>
-                                          <p:spTgt spid="11"/>
-                                        </p:tgtEl>
-                                        <p:attrNameLst>
-                                          <p:attrName>ppt_y</p:attrName>
-                                        </p:attrNameLst>
-                                      </p:cBhvr>
-                                      <p:tavLst>
-                                        <p:tav tm="0">
-                                          <p:val>
-                                            <p:strVal val="#ppt_y+#ppt_h*1.125000"/>
-                                          </p:val>
-                                        </p:tav>
-                                        <p:tav tm="100000">
-                                          <p:val>
-                                            <p:strVal val="#ppt_y"/>
-                                          </p:val>
-                                        </p:tav>
-                                      </p:tavLst>
-                                    </p:anim>
-                                    <p:animEffect transition="in" filter="wipe(up)">
-                                      <p:cBhvr>
-                                        <p:cTn id="52" dur="500"/>
-                                        <p:tgtEl>
-                                          <p:spTgt spid="11"/>
-                                        </p:tgtEl>
-                                      </p:cBhvr>
-                                    </p:animEffect>
-                                  </p:childTnLst>
-                                </p:cTn>
-                              </p:par>
-                              <p:par>
-                                <p:cTn id="53" presetID="12" presetClass="entr" presetSubtype="4" fill="hold" grpId="0" nodeType="withEffect">
-                                  <p:stCondLst>
-                                    <p:cond delay="0"/>
-                                  </p:stCondLst>
-                                  <p:childTnLst>
-                                    <p:set>
-                                      <p:cBhvr>
-                                        <p:cTn id="54" dur="1" fill="hold">
-                                          <p:stCondLst>
-                                            <p:cond delay="0"/>
-                                          </p:stCondLst>
-                                        </p:cTn>
-                                        <p:tgtEl>
-                                          <p:spTgt spid="13"/>
-                                        </p:tgtEl>
-                                        <p:attrNameLst>
-                                          <p:attrName>style.visibility</p:attrName>
-                                        </p:attrNameLst>
-                                      </p:cBhvr>
-                                      <p:to>
-                                        <p:strVal val="visible"/>
-                                      </p:to>
-                                    </p:set>
-                                    <p:anim calcmode="lin" valueType="num">
-                                      <p:cBhvr additive="base">
-                                        <p:cTn id="55" dur="500"/>
-                                        <p:tgtEl>
-                                          <p:spTgt spid="13"/>
-                                        </p:tgtEl>
-                                        <p:attrNameLst>
-                                          <p:attrName>ppt_y</p:attrName>
-                                        </p:attrNameLst>
-                                      </p:cBhvr>
-                                      <p:tavLst>
-                                        <p:tav tm="0">
-                                          <p:val>
-                                            <p:strVal val="#ppt_y+#ppt_h*1.125000"/>
-                                          </p:val>
-                                        </p:tav>
-                                        <p:tav tm="100000">
-                                          <p:val>
-                                            <p:strVal val="#ppt_y"/>
-                                          </p:val>
-                                        </p:tav>
-                                      </p:tavLst>
-                                    </p:anim>
-                                    <p:animEffect transition="in" filter="wipe(up)">
-                                      <p:cBhvr>
-                                        <p:cTn id="56" dur="500"/>
-                                        <p:tgtEl>
-                                          <p:spTgt spid="13"/>
-                                        </p:tgtEl>
-                                      </p:cBhvr>
-                                    </p:animEffect>
-                                  </p:childTnLst>
-                                </p:cTn>
-                              </p:par>
-                              <p:par>
-                                <p:cTn id="57" presetID="12" presetClass="entr" presetSubtype="4" fill="hold" nodeType="withEffect">
-                                  <p:stCondLst>
-                                    <p:cond delay="0"/>
-                                  </p:stCondLst>
-                                  <p:childTnLst>
-                                    <p:set>
-                                      <p:cBhvr>
-                                        <p:cTn id="58" dur="1" fill="hold">
-                                          <p:stCondLst>
-                                            <p:cond delay="0"/>
-                                          </p:stCondLst>
-                                        </p:cTn>
-                                        <p:tgtEl>
-                                          <p:spTgt spid="14"/>
-                                        </p:tgtEl>
-                                        <p:attrNameLst>
-                                          <p:attrName>style.visibility</p:attrName>
-                                        </p:attrNameLst>
-                                      </p:cBhvr>
-                                      <p:to>
-                                        <p:strVal val="visible"/>
-                                      </p:to>
-                                    </p:set>
-                                    <p:anim calcmode="lin" valueType="num">
-                                      <p:cBhvr additive="base">
-                                        <p:cTn id="59" dur="500"/>
-                                        <p:tgtEl>
-                                          <p:spTgt spid="14"/>
-                                        </p:tgtEl>
-                                        <p:attrNameLst>
-                                          <p:attrName>ppt_y</p:attrName>
-                                        </p:attrNameLst>
-                                      </p:cBhvr>
-                                      <p:tavLst>
-                                        <p:tav tm="0">
-                                          <p:val>
-                                            <p:strVal val="#ppt_y+#ppt_h*1.125000"/>
-                                          </p:val>
-                                        </p:tav>
-                                        <p:tav tm="100000">
-                                          <p:val>
-                                            <p:strVal val="#ppt_y"/>
-                                          </p:val>
-                                        </p:tav>
-                                      </p:tavLst>
-                                    </p:anim>
-                                    <p:animEffect transition="in" filter="wipe(up)">
-                                      <p:cBhvr>
-                                        <p:cTn id="60" dur="500"/>
-                                        <p:tgtEl>
-                                          <p:spTgt spid="14"/>
-                                        </p:tgtEl>
-                                      </p:cBhvr>
-                                    </p:animEffect>
-                                  </p:childTnLst>
-                                </p:cTn>
-                              </p:par>
-                              <p:par>
-                                <p:cTn id="61" presetID="12" presetClass="entr" presetSubtype="4" fill="hold" grpId="0" nodeType="withEffect">
-                                  <p:stCondLst>
-                                    <p:cond delay="0"/>
-                                  </p:stCondLst>
-                                  <p:childTnLst>
-                                    <p:set>
-                                      <p:cBhvr>
-                                        <p:cTn id="62" dur="1" fill="hold">
-                                          <p:stCondLst>
-                                            <p:cond delay="0"/>
-                                          </p:stCondLst>
-                                        </p:cTn>
-                                        <p:tgtEl>
-                                          <p:spTgt spid="21"/>
-                                        </p:tgtEl>
-                                        <p:attrNameLst>
-                                          <p:attrName>style.visibility</p:attrName>
-                                        </p:attrNameLst>
-                                      </p:cBhvr>
-                                      <p:to>
-                                        <p:strVal val="visible"/>
-                                      </p:to>
-                                    </p:set>
-                                    <p:anim calcmode="lin" valueType="num">
-                                      <p:cBhvr additive="base">
-                                        <p:cTn id="63" dur="500"/>
-                                        <p:tgtEl>
-                                          <p:spTgt spid="21"/>
-                                        </p:tgtEl>
-                                        <p:attrNameLst>
-                                          <p:attrName>ppt_y</p:attrName>
-                                        </p:attrNameLst>
-                                      </p:cBhvr>
-                                      <p:tavLst>
-                                        <p:tav tm="0">
-                                          <p:val>
-                                            <p:strVal val="#ppt_y+#ppt_h*1.125000"/>
-                                          </p:val>
-                                        </p:tav>
-                                        <p:tav tm="100000">
-                                          <p:val>
-                                            <p:strVal val="#ppt_y"/>
-                                          </p:val>
-                                        </p:tav>
-                                      </p:tavLst>
-                                    </p:anim>
-                                    <p:animEffect transition="in" filter="wipe(up)">
-                                      <p:cBhvr>
-                                        <p:cTn id="64" dur="500"/>
-                                        <p:tgtEl>
-                                          <p:spTgt spid="21"/>
-                                        </p:tgtEl>
-                                      </p:cBhvr>
-                                    </p:animEffect>
-                                  </p:childTnLst>
-                                </p:cTn>
-                              </p:par>
-                              <p:par>
-                                <p:cTn id="65" presetID="12" presetClass="entr" presetSubtype="4" fill="hold" nodeType="withEffect">
-                                  <p:stCondLst>
-                                    <p:cond delay="0"/>
-                                  </p:stCondLst>
-                                  <p:childTnLst>
-                                    <p:set>
-                                      <p:cBhvr>
-                                        <p:cTn id="66" dur="1" fill="hold">
-                                          <p:stCondLst>
-                                            <p:cond delay="0"/>
-                                          </p:stCondLst>
-                                        </p:cTn>
-                                        <p:tgtEl>
-                                          <p:spTgt spid="5"/>
-                                        </p:tgtEl>
-                                        <p:attrNameLst>
-                                          <p:attrName>style.visibility</p:attrName>
-                                        </p:attrNameLst>
-                                      </p:cBhvr>
-                                      <p:to>
-                                        <p:strVal val="visible"/>
-                                      </p:to>
-                                    </p:set>
-                                    <p:anim calcmode="lin" valueType="num">
-                                      <p:cBhvr additive="base">
-                                        <p:cTn id="67" dur="500"/>
-                                        <p:tgtEl>
-                                          <p:spTgt spid="5"/>
-                                        </p:tgtEl>
-                                        <p:attrNameLst>
-                                          <p:attrName>ppt_y</p:attrName>
-                                        </p:attrNameLst>
-                                      </p:cBhvr>
-                                      <p:tavLst>
-                                        <p:tav tm="0">
-                                          <p:val>
-                                            <p:strVal val="#ppt_y+#ppt_h*1.125000"/>
-                                          </p:val>
-                                        </p:tav>
-                                        <p:tav tm="100000">
-                                          <p:val>
-                                            <p:strVal val="#ppt_y"/>
-                                          </p:val>
-                                        </p:tav>
-                                      </p:tavLst>
-                                    </p:anim>
-                                    <p:animEffect transition="in" filter="wipe(up)">
-                                      <p:cBhvr>
-                                        <p:cTn id="68" dur="500"/>
-                                        <p:tgtEl>
-                                          <p:spTgt spid="5"/>
+                                        <p:cTn id="72" dur="500"/>
+                                        <p:tgtEl>
+                                          <p:spTgt spid="24"/>
                                         </p:tgtEl>
                                       </p:cBhvr>
                                     </p:animEffect>
@@ -6175,9 +6405,10 @@
       <p:bldP spid="13" grpId="0"/>
       <p:bldP spid="17" grpId="0"/>
       <p:bldP spid="18" grpId="0"/>
-      <p:bldP spid="19" grpId="0"/>
       <p:bldP spid="20" grpId="0"/>
       <p:bldP spid="21" grpId="0"/>
+      <p:bldP spid="23" grpId="0"/>
+      <p:bldP spid="24" grpId="0"/>
     </p:bldLst>
   </p:timing>
 </p:sld>
@@ -6716,7 +6947,7 @@
         </p:blipFill>
         <p:spPr>
           <a:xfrm>
-            <a:off x="7865629" y="3839130"/>
+            <a:off x="7797847" y="4197986"/>
             <a:ext cx="1171222" cy="1171222"/>
           </a:xfrm>
           <a:prstGeom prst="rect">
@@ -6748,6 +6979,30 @@
           <a:xfrm>
             <a:off x="-95587" y="2739142"/>
             <a:ext cx="2225830" cy="1246465"/>
+          </a:xfrm>
+          <a:prstGeom prst="rect">
+            <a:avLst/>
+          </a:prstGeom>
+        </p:spPr>
+      </p:pic>
+      <p:pic>
+        <p:nvPicPr>
+          <p:cNvPr id="14" name="Afbeelding 13"/>
+          <p:cNvPicPr>
+            <a:picLocks noChangeAspect="1"/>
+          </p:cNvPicPr>
+          <p:nvPr/>
+        </p:nvPicPr>
+        <p:blipFill>
+          <a:blip r:embed="rId5"/>
+          <a:stretch>
+            <a:fillRect/>
+          </a:stretch>
+        </p:blipFill>
+        <p:spPr>
+          <a:xfrm>
+            <a:off x="7865629" y="3677194"/>
+            <a:ext cx="997143" cy="520792"/>
           </a:xfrm>
           <a:prstGeom prst="rect">
             <a:avLst/>
@@ -7070,30 +7325,6 @@
           </a:p>
         </p:txBody>
       </p:sp>
-      <p:pic>
-        <p:nvPicPr>
-          <p:cNvPr id="11" name="Afbeelding 10"/>
-          <p:cNvPicPr>
-            <a:picLocks noChangeAspect="1"/>
-          </p:cNvPicPr>
-          <p:nvPr/>
-        </p:nvPicPr>
-        <p:blipFill>
-          <a:blip r:embed="rId2"/>
-          <a:stretch>
-            <a:fillRect/>
-          </a:stretch>
-        </p:blipFill>
-        <p:spPr>
-          <a:xfrm>
-            <a:off x="3892089" y="3063095"/>
-            <a:ext cx="1379013" cy="922512"/>
-          </a:xfrm>
-          <a:prstGeom prst="rect">
-            <a:avLst/>
-          </a:prstGeom>
-        </p:spPr>
-      </p:pic>
       <p:sp>
         <p:nvSpPr>
           <p:cNvPr id="13" name="Ingekeepte pijl rechts 12"/>
@@ -7151,6 +7382,30 @@
           <p:nvPr/>
         </p:nvPicPr>
         <p:blipFill>
+          <a:blip r:embed="rId2"/>
+          <a:stretch>
+            <a:fillRect/>
+          </a:stretch>
+        </p:blipFill>
+        <p:spPr>
+          <a:xfrm>
+            <a:off x="7865629" y="3839130"/>
+            <a:ext cx="1171222" cy="1171222"/>
+          </a:xfrm>
+          <a:prstGeom prst="rect">
+            <a:avLst/>
+          </a:prstGeom>
+        </p:spPr>
+      </p:pic>
+      <p:pic>
+        <p:nvPicPr>
+          <p:cNvPr id="19" name="Afbeelding 18"/>
+          <p:cNvPicPr>
+            <a:picLocks noChangeAspect="1"/>
+          </p:cNvPicPr>
+          <p:nvPr/>
+        </p:nvPicPr>
+        <p:blipFill>
           <a:blip r:embed="rId3"/>
           <a:stretch>
             <a:fillRect/>
@@ -7158,8 +7413,8 @@
         </p:blipFill>
         <p:spPr>
           <a:xfrm>
-            <a:off x="7865629" y="3839130"/>
-            <a:ext cx="1171222" cy="1171222"/>
+            <a:off x="253796" y="2955496"/>
+            <a:ext cx="1030111" cy="1030111"/>
           </a:xfrm>
           <a:prstGeom prst="rect">
             <a:avLst/>
@@ -7168,7 +7423,7 @@
       </p:pic>
       <p:pic>
         <p:nvPicPr>
-          <p:cNvPr id="19" name="Afbeelding 18"/>
+          <p:cNvPr id="9" name="Afbeelding 8"/>
           <p:cNvPicPr>
             <a:picLocks noChangeAspect="1"/>
           </p:cNvPicPr>
@@ -7182,8 +7437,8 @@
         </p:blipFill>
         <p:spPr>
           <a:xfrm>
-            <a:off x="253796" y="2955496"/>
-            <a:ext cx="1030111" cy="1030111"/>
+            <a:off x="4029828" y="3156402"/>
+            <a:ext cx="1432726" cy="748290"/>
           </a:xfrm>
           <a:prstGeom prst="rect">
             <a:avLst/>
@@ -7237,7 +7492,7 @@
                                           </p:stCondLst>
                                         </p:cTn>
                                         <p:tgtEl>
-                                          <p:spTgt spid="11"/>
+                                          <p:spTgt spid="18"/>
                                         </p:tgtEl>
                                         <p:attrNameLst>
                                           <p:attrName>style.visibility</p:attrName>
@@ -7251,7 +7506,7 @@
                                       <p:cBhvr additive="base">
                                         <p:cTn id="7" dur="500"/>
                                         <p:tgtEl>
-                                          <p:spTgt spid="11"/>
+                                          <p:spTgt spid="18"/>
                                         </p:tgtEl>
                                         <p:attrNameLst>
                                           <p:attrName>ppt_y</p:attrName>
@@ -7274,7 +7529,7 @@
                                       <p:cBhvr>
                                         <p:cTn id="8" dur="500"/>
                                         <p:tgtEl>
-                                          <p:spTgt spid="11"/>
+                                          <p:spTgt spid="18"/>
                                         </p:tgtEl>
                                       </p:cBhvr>
                                     </p:animEffect>
@@ -7295,7 +7550,7 @@
                                           </p:stCondLst>
                                         </p:cTn>
                                         <p:tgtEl>
-                                          <p:spTgt spid="18"/>
+                                          <p:spTgt spid="19"/>
                                         </p:tgtEl>
                                         <p:attrNameLst>
                                           <p:attrName>style.visibility</p:attrName>
@@ -7309,7 +7564,7 @@
                                       <p:cBhvr additive="base">
                                         <p:cTn id="11" dur="500"/>
                                         <p:tgtEl>
-                                          <p:spTgt spid="18"/>
+                                          <p:spTgt spid="19"/>
                                         </p:tgtEl>
                                         <p:attrNameLst>
                                           <p:attrName>ppt_y</p:attrName>
@@ -7331,64 +7586,6 @@
                                     <p:animEffect transition="in" filter="wipe(up)">
                                       <p:cBhvr>
                                         <p:cTn id="12" dur="500"/>
-                                        <p:tgtEl>
-                                          <p:spTgt spid="18"/>
-                                        </p:tgtEl>
-                                      </p:cBhvr>
-                                    </p:animEffect>
-                                  </p:childTnLst>
-                                </p:cTn>
-                              </p:par>
-                              <p:par>
-                                <p:cTn id="13" presetID="12" presetClass="entr" presetSubtype="4" fill="hold" nodeType="withEffect">
-                                  <p:stCondLst>
-                                    <p:cond delay="0"/>
-                                  </p:stCondLst>
-                                  <p:childTnLst>
-                                    <p:set>
-                                      <p:cBhvr>
-                                        <p:cTn id="14" dur="1" fill="hold">
-                                          <p:stCondLst>
-                                            <p:cond delay="0"/>
-                                          </p:stCondLst>
-                                        </p:cTn>
-                                        <p:tgtEl>
-                                          <p:spTgt spid="19"/>
-                                        </p:tgtEl>
-                                        <p:attrNameLst>
-                                          <p:attrName>style.visibility</p:attrName>
-                                        </p:attrNameLst>
-                                      </p:cBhvr>
-                                      <p:to>
-                                        <p:strVal val="visible"/>
-                                      </p:to>
-                                    </p:set>
-                                    <p:anim calcmode="lin" valueType="num">
-                                      <p:cBhvr additive="base">
-                                        <p:cTn id="15" dur="500"/>
-                                        <p:tgtEl>
-                                          <p:spTgt spid="19"/>
-                                        </p:tgtEl>
-                                        <p:attrNameLst>
-                                          <p:attrName>ppt_y</p:attrName>
-                                        </p:attrNameLst>
-                                      </p:cBhvr>
-                                      <p:tavLst>
-                                        <p:tav tm="0">
-                                          <p:val>
-                                            <p:strVal val="#ppt_y+#ppt_h*1.125000"/>
-                                          </p:val>
-                                        </p:tav>
-                                        <p:tav tm="100000">
-                                          <p:val>
-                                            <p:strVal val="#ppt_y"/>
-                                          </p:val>
-                                        </p:tav>
-                                      </p:tavLst>
-                                    </p:anim>
-                                    <p:animEffect transition="in" filter="wipe(up)">
-                                      <p:cBhvr>
-                                        <p:cTn id="16" dur="500"/>
                                         <p:tgtEl>
                                           <p:spTgt spid="19"/>
                                         </p:tgtEl>
@@ -7742,8 +7939,8 @@
         </p:blipFill>
         <p:spPr>
           <a:xfrm>
-            <a:off x="7838318" y="2868827"/>
-            <a:ext cx="1171222" cy="1171222"/>
+            <a:off x="7974155" y="3357321"/>
+            <a:ext cx="888585" cy="888585"/>
           </a:xfrm>
           <a:prstGeom prst="rect">
             <a:avLst/>
@@ -7882,6 +8079,30 @@
           </a:p>
         </p:txBody>
       </p:sp>
+      <p:pic>
+        <p:nvPicPr>
+          <p:cNvPr id="18" name="Afbeelding 17"/>
+          <p:cNvPicPr>
+            <a:picLocks noChangeAspect="1"/>
+          </p:cNvPicPr>
+          <p:nvPr/>
+        </p:nvPicPr>
+        <p:blipFill>
+          <a:blip r:embed="rId8"/>
+          <a:stretch>
+            <a:fillRect/>
+          </a:stretch>
+        </p:blipFill>
+        <p:spPr>
+          <a:xfrm>
+            <a:off x="7865597" y="2701207"/>
+            <a:ext cx="997143" cy="520792"/>
+          </a:xfrm>
+          <a:prstGeom prst="rect">
+            <a:avLst/>
+          </a:prstGeom>
+        </p:spPr>
+      </p:pic>
     </p:spTree>
     <p:extLst>
       <p:ext uri="{BB962C8B-B14F-4D97-AF65-F5344CB8AC3E}">
@@ -8505,7 +8726,7 @@
         </p:blipFill>
         <p:spPr>
           <a:xfrm>
-            <a:off x="3864778" y="2434809"/>
+            <a:off x="3864778" y="2896065"/>
             <a:ext cx="1379013" cy="922512"/>
           </a:xfrm>
           <a:prstGeom prst="rect">
@@ -8577,7 +8798,7 @@
         </p:blipFill>
         <p:spPr>
           <a:xfrm>
-            <a:off x="7838318" y="2868827"/>
+            <a:off x="7838318" y="3357321"/>
             <a:ext cx="1171222" cy="1171222"/>
           </a:xfrm>
           <a:prstGeom prst="rect">
@@ -8607,7 +8828,7 @@
         </p:blipFill>
         <p:spPr>
           <a:xfrm>
-            <a:off x="8025540" y="4325946"/>
+            <a:off x="8025540" y="4657811"/>
             <a:ext cx="596434" cy="584852"/>
           </a:xfrm>
           <a:prstGeom prst="rect">
@@ -8631,7 +8852,7 @@
         </p:blipFill>
         <p:spPr>
           <a:xfrm>
-            <a:off x="7851973" y="4910798"/>
+            <a:off x="7851973" y="5242663"/>
             <a:ext cx="905838" cy="640032"/>
           </a:xfrm>
           <a:prstGeom prst="rect">
@@ -8661,7 +8882,7 @@
         </p:blipFill>
         <p:spPr>
           <a:xfrm>
-            <a:off x="7729075" y="5376761"/>
+            <a:off x="7729075" y="5708626"/>
             <a:ext cx="1169366" cy="877025"/>
           </a:xfrm>
           <a:prstGeom prst="rect">
@@ -8677,7 +8898,7 @@
         </p:nvSpPr>
         <p:spPr>
           <a:xfrm flipH="1">
-            <a:off x="1747891" y="5171635"/>
+            <a:off x="1747891" y="5503500"/>
             <a:ext cx="5981183" cy="758389"/>
           </a:xfrm>
           <a:prstGeom prst="notchedRightArrow">
@@ -8739,8 +8960,32 @@
         </p:blipFill>
         <p:spPr>
           <a:xfrm>
-            <a:off x="95588" y="4753528"/>
+            <a:off x="95588" y="5242663"/>
             <a:ext cx="2225830" cy="1246465"/>
+          </a:xfrm>
+          <a:prstGeom prst="rect">
+            <a:avLst/>
+          </a:prstGeom>
+        </p:spPr>
+      </p:pic>
+      <p:pic>
+        <p:nvPicPr>
+          <p:cNvPr id="14" name="Afbeelding 13"/>
+          <p:cNvPicPr>
+            <a:picLocks noChangeAspect="1"/>
+          </p:cNvPicPr>
+          <p:nvPr/>
+        </p:nvPicPr>
+        <p:blipFill>
+          <a:blip r:embed="rId8"/>
+          <a:stretch>
+            <a:fillRect/>
+          </a:stretch>
+        </p:blipFill>
+        <p:spPr>
+          <a:xfrm>
+            <a:off x="7942538" y="2674593"/>
+            <a:ext cx="997143" cy="520792"/>
           </a:xfrm>
           <a:prstGeom prst="rect">
             <a:avLst/>
@@ -9403,8 +9648,32 @@
         </p:blipFill>
         <p:spPr>
           <a:xfrm>
-            <a:off x="7811007" y="3469627"/>
+            <a:off x="7811007" y="3958121"/>
             <a:ext cx="1171222" cy="1171222"/>
+          </a:xfrm>
+          <a:prstGeom prst="rect">
+            <a:avLst/>
+          </a:prstGeom>
+        </p:spPr>
+      </p:pic>
+      <p:pic>
+        <p:nvPicPr>
+          <p:cNvPr id="10" name="Afbeelding 9"/>
+          <p:cNvPicPr>
+            <a:picLocks noChangeAspect="1"/>
+          </p:cNvPicPr>
+          <p:nvPr/>
+        </p:nvPicPr>
+        <p:blipFill>
+          <a:blip r:embed="rId5"/>
+          <a:stretch>
+            <a:fillRect/>
+          </a:stretch>
+        </p:blipFill>
+        <p:spPr>
+          <a:xfrm>
+            <a:off x="7811007" y="3247782"/>
+            <a:ext cx="997143" cy="520792"/>
           </a:xfrm>
           <a:prstGeom prst="rect">
             <a:avLst/>
@@ -9735,7 +10004,7 @@
         </p:blipFill>
         <p:spPr>
           <a:xfrm>
-            <a:off x="3893754" y="5114016"/>
+            <a:off x="3515216" y="5114016"/>
             <a:ext cx="1171222" cy="1171222"/>
           </a:xfrm>
           <a:prstGeom prst="rect">
@@ -9944,15 +10213,15 @@
         <p:nvCxnSpPr>
           <p:cNvPr id="9" name="Rechte verbindingslijn met pijl 8"/>
           <p:cNvCxnSpPr>
-            <a:stCxn id="20" idx="3"/>
+            <a:stCxn id="15" idx="0"/>
             <a:endCxn id="24" idx="1"/>
           </p:cNvCxnSpPr>
           <p:nvPr/>
         </p:nvCxnSpPr>
         <p:spPr>
           <a:xfrm flipV="1">
-            <a:off x="5064976" y="3602425"/>
-            <a:ext cx="2192315" cy="2097202"/>
+            <a:off x="7055185" y="3602425"/>
+            <a:ext cx="202106" cy="1836806"/>
           </a:xfrm>
           <a:prstGeom prst="straightConnector1">
             <a:avLst/>
@@ -10053,15 +10322,74 @@
       <p:cxnSp>
         <p:nvCxnSpPr>
           <p:cNvPr id="33" name="Rechte verbindingslijn met pijl 32"/>
+          <p:cNvCxnSpPr/>
+          <p:nvPr/>
+        </p:nvCxnSpPr>
+        <p:spPr>
+          <a:xfrm>
+            <a:off x="1598889" y="2869076"/>
+            <a:ext cx="4957724" cy="2570155"/>
+          </a:xfrm>
+          <a:prstGeom prst="straightConnector1">
+            <a:avLst/>
+          </a:prstGeom>
+          <a:ln>
+            <a:headEnd type="arrow"/>
+            <a:tailEnd type="arrow"/>
+          </a:ln>
+        </p:spPr>
+        <p:style>
+          <a:lnRef idx="2">
+            <a:schemeClr val="accent1"/>
+          </a:lnRef>
+          <a:fillRef idx="0">
+            <a:schemeClr val="accent1"/>
+          </a:fillRef>
+          <a:effectRef idx="1">
+            <a:schemeClr val="accent1"/>
+          </a:effectRef>
+          <a:fontRef idx="minor">
+            <a:schemeClr val="tx1"/>
+          </a:fontRef>
+        </p:style>
+      </p:cxnSp>
+      <p:pic>
+        <p:nvPicPr>
+          <p:cNvPr id="15" name="Afbeelding 14"/>
+          <p:cNvPicPr>
+            <a:picLocks noChangeAspect="1"/>
+          </p:cNvPicPr>
+          <p:nvPr/>
+        </p:nvPicPr>
+        <p:blipFill>
+          <a:blip r:embed="rId9"/>
+          <a:stretch>
+            <a:fillRect/>
+          </a:stretch>
+        </p:blipFill>
+        <p:spPr>
+          <a:xfrm>
+            <a:off x="6556613" y="5439231"/>
+            <a:ext cx="997143" cy="520792"/>
+          </a:xfrm>
+          <a:prstGeom prst="rect">
+            <a:avLst/>
+          </a:prstGeom>
+        </p:spPr>
+      </p:pic>
+      <p:cxnSp>
+        <p:nvCxnSpPr>
+          <p:cNvPr id="18" name="Rechte verbindingslijn met pijl 17"/>
           <p:cNvCxnSpPr>
-            <a:endCxn id="20" idx="1"/>
+            <a:stCxn id="15" idx="1"/>
+            <a:endCxn id="20" idx="3"/>
           </p:cNvCxnSpPr>
           <p:nvPr/>
         </p:nvCxnSpPr>
         <p:spPr>
-          <a:xfrm>
-            <a:off x="1598889" y="2869076"/>
-            <a:ext cx="2294865" cy="2830551"/>
+          <a:xfrm flipH="1">
+            <a:off x="4686438" y="5699627"/>
+            <a:ext cx="1870175" cy="0"/>
           </a:xfrm>
           <a:prstGeom prst="straightConnector1">
             <a:avLst/>
@@ -16852,8 +17180,8 @@
           </a:p>
         </p:txBody>
       </p:sp>
-      <mc:AlternateContent xmlns:mc="http://schemas.openxmlformats.org/markup-compatibility/2006">
-        <mc:Choice xmlns:a14="http://schemas.microsoft.com/office/drawing/2010/main" Requires="a14">
+      <mc:AlternateContent xmlns:mc="http://schemas.openxmlformats.org/markup-compatibility/2006" xmlns:a14="http://schemas.microsoft.com/office/drawing/2010/main">
+        <mc:Choice Requires="a14">
           <p:sp>
             <p:nvSpPr>
               <p:cNvPr id="8" name="Content Placeholder 6"/>
@@ -16873,7 +17201,7 @@
             </p:spPr>
             <p:txBody>
               <a:bodyPr vert="horz" lIns="91440" tIns="45720" rIns="91440" bIns="45720" rtlCol="0">
-                <a:normAutofit fontScale="92500"/>
+                <a:normAutofit/>
               </a:bodyPr>
               <a:lstStyle>
                 <a:lvl1pPr marL="342900" indent="-342900" algn="l" defTabSz="457200" rtl="0" eaLnBrk="1" latinLnBrk="0" hangingPunct="1">
@@ -17017,7 +17345,6 @@
                   <a:buFont typeface="Arial"/>
                   <a:buNone/>
                 </a:pPr>
-                <a14:m/>
                 <a:endParaRPr lang="nl-NL" dirty="0" smtClean="0"/>
               </a:p>
               <a:p>
@@ -17030,7 +17357,6 @@
                 </a:endParaRPr>
               </a:p>
               <a:p>
-                <a14:m/>
                 <a:r>
                   <a:rPr lang="nl-NL" sz="2400" dirty="0" smtClean="0"/>
                   <a:t> = </a:t>
@@ -17052,7 +17378,6 @@
                 </a:endParaRPr>
               </a:p>
               <a:p>
-                <a14:m/>
                 <a:r>
                   <a:rPr lang="nl-NL" sz="2400" dirty="0" smtClean="0"/>
                   <a:t> = </a:t>
@@ -17069,7 +17394,6 @@
                   </a:rPr>
                   <a:t> of term </a:t>
                 </a:r>
-                <a14:m/>
                 <a:r>
                   <a:rPr lang="nl-NL" sz="2400" dirty="0" smtClean="0"/>
                   <a:t> </a:t>
@@ -17092,11 +17416,9 @@
                   </a:rPr>
                   <a:t> </a:t>
                 </a:r>
-                <a14:m/>
                 <a:endParaRPr lang="nl-NL" sz="2400" dirty="0" smtClean="0"/>
               </a:p>
               <a:p>
-                <a14:m/>
                 <a:r>
                   <a:rPr lang="nl-NL" sz="2400" dirty="0" smtClean="0"/>
                   <a:t> = </a:t>
@@ -17113,7 +17435,6 @@
                   </a:rPr>
                   <a:t> of term </a:t>
                 </a:r>
-                <a14:m/>
                 <a:r>
                   <a:rPr lang="nl-NL" sz="2400" dirty="0" smtClean="0"/>
                   <a:t> </a:t>
@@ -17134,11 +17455,8 @@
                   <a:rPr lang="nl-NL" sz="2400" dirty="0" smtClean="0"/>
                   <a:t> </a:t>
                 </a:r>
-                <a14:m/>
-                <a:endParaRPr lang="nl-NL" sz="2400" dirty="0" smtClean="0"/>
               </a:p>
               <a:p>
-                <a14:m/>
                 <a:r>
                   <a:rPr lang="nl-NL" sz="2400" i="1" dirty="0" smtClean="0">
                     <a:latin typeface="Cambria Math" panose="02040503050406030204" pitchFamily="18" charset="0"/>
@@ -17161,14 +17479,7 @@
                   <a:rPr lang="nl-NL" sz="2400" dirty="0" smtClean="0">
                     <a:latin typeface="Cambria Math" panose="02040503050406030204" pitchFamily="18" charset="0"/>
                   </a:rPr>
-                  <a:t> term </a:t>
-                </a:r>
-                <a14:m/>
-                <a:r>
-                  <a:rPr lang="nl-NL" sz="2400" dirty="0" smtClean="0">
-                    <a:latin typeface="Cambria Math" panose="02040503050406030204" pitchFamily="18" charset="0"/>
-                  </a:rPr>
-                  <a:t> </a:t>
+                  <a:t> term  </a:t>
                 </a:r>
                 <a:r>
                   <a:rPr lang="nl-NL" sz="2400" dirty="0" err="1" smtClean="0">
@@ -17205,7 +17516,6 @@
                 </a:endParaRPr>
               </a:p>
               <a:p>
-                <a14:m/>
                 <a:r>
                   <a:rPr lang="nl-NL" sz="2400" dirty="0" smtClean="0"/>
                   <a:t> = </a:t>
@@ -17216,7 +17526,6 @@
                   </a:rPr>
                   <a:t>SCS score of term </a:t>
                 </a:r>
-                <a14:m/>
                 <a:r>
                   <a:rPr lang="nl-NL" sz="2400" dirty="0" smtClean="0"/>
                   <a:t> </a:t>
@@ -17261,7 +17570,7 @@
             </p:txBody>
           </p:sp>
         </mc:Choice>
-        <mc:Fallback>
+        <mc:Fallback xmlns="">
           <p:sp>
             <p:nvSpPr>
               <p:cNvPr id="8" name="Content Placeholder 6"/>

</xml_diff>